<commit_message>
improve 3d sw number fig
</commit_message>
<xml_diff>
--- a/fig/sw.pptx
+++ b/fig/sw.pptx
@@ -4,14 +4,18 @@
   <p:sldMasterIdLst>
     <p:sldMasterId id="2147483648" r:id="rId1"/>
   </p:sldMasterIdLst>
+  <p:notesMasterIdLst>
+    <p:notesMasterId r:id="rId10"/>
+  </p:notesMasterIdLst>
   <p:sldIdLst>
     <p:sldId id="256" r:id="rId2"/>
     <p:sldId id="260" r:id="rId3"/>
     <p:sldId id="261" r:id="rId4"/>
     <p:sldId id="262" r:id="rId5"/>
-    <p:sldId id="257" r:id="rId6"/>
-    <p:sldId id="258" r:id="rId7"/>
-    <p:sldId id="259" r:id="rId8"/>
+    <p:sldId id="263" r:id="rId6"/>
+    <p:sldId id="257" r:id="rId7"/>
+    <p:sldId id="258" r:id="rId8"/>
+    <p:sldId id="259" r:id="rId9"/>
   </p:sldIdLst>
   <p:sldSz cx="12192000" cy="6858000"/>
   <p:notesSz cx="6858000" cy="9144000"/>
@@ -118,6 +122,388 @@
 </p:presentation>
 </file>
 
+<file path=ppt/notesMasters/notesMaster1.xml><?xml version="1.0" encoding="utf-8"?>
+<p:notesMaster xmlns:a="http://schemas.openxmlformats.org/drawingml/2006/main" xmlns:r="http://schemas.openxmlformats.org/officeDocument/2006/relationships" xmlns:p="http://schemas.openxmlformats.org/presentationml/2006/main">
+  <p:cSld>
+    <p:bg>
+      <p:bgRef idx="1001">
+        <a:schemeClr val="bg1"/>
+      </p:bgRef>
+    </p:bg>
+    <p:spTree>
+      <p:nvGrpSpPr>
+        <p:cNvPr id="1" name=""/>
+        <p:cNvGrpSpPr/>
+        <p:nvPr/>
+      </p:nvGrpSpPr>
+      <p:grpSpPr>
+        <a:xfrm>
+          <a:off x="0" y="0"/>
+          <a:ext cx="0" cy="0"/>
+          <a:chOff x="0" y="0"/>
+          <a:chExt cx="0" cy="0"/>
+        </a:xfrm>
+      </p:grpSpPr>
+      <p:sp>
+        <p:nvSpPr>
+          <p:cNvPr id="2" name="ヘッダー プレースホルダー 1"/>
+          <p:cNvSpPr>
+            <a:spLocks noGrp="1"/>
+          </p:cNvSpPr>
+          <p:nvPr>
+            <p:ph type="hdr" sz="quarter"/>
+          </p:nvPr>
+        </p:nvSpPr>
+        <p:spPr>
+          <a:xfrm>
+            <a:off x="0" y="0"/>
+            <a:ext cx="2971800" cy="458788"/>
+          </a:xfrm>
+          <a:prstGeom prst="rect">
+            <a:avLst/>
+          </a:prstGeom>
+        </p:spPr>
+        <p:txBody>
+          <a:bodyPr vert="horz" lIns="91440" tIns="45720" rIns="91440" bIns="45720" rtlCol="0"/>
+          <a:lstStyle>
+            <a:lvl1pPr algn="l">
+              <a:defRPr sz="1200"/>
+            </a:lvl1pPr>
+          </a:lstStyle>
+          <a:p>
+            <a:endParaRPr kumimoji="1" lang="ja-JP" altLang="en-US"/>
+          </a:p>
+        </p:txBody>
+      </p:sp>
+      <p:sp>
+        <p:nvSpPr>
+          <p:cNvPr id="3" name="日付プレースホルダー 2"/>
+          <p:cNvSpPr>
+            <a:spLocks noGrp="1"/>
+          </p:cNvSpPr>
+          <p:nvPr>
+            <p:ph type="dt" idx="1"/>
+          </p:nvPr>
+        </p:nvSpPr>
+        <p:spPr>
+          <a:xfrm>
+            <a:off x="3884613" y="0"/>
+            <a:ext cx="2971800" cy="458788"/>
+          </a:xfrm>
+          <a:prstGeom prst="rect">
+            <a:avLst/>
+          </a:prstGeom>
+        </p:spPr>
+        <p:txBody>
+          <a:bodyPr vert="horz" lIns="91440" tIns="45720" rIns="91440" bIns="45720" rtlCol="0"/>
+          <a:lstStyle>
+            <a:lvl1pPr algn="r">
+              <a:defRPr sz="1200"/>
+            </a:lvl1pPr>
+          </a:lstStyle>
+          <a:p>
+            <a:fld id="{460DA1DD-F5AE-5647-9F5F-521F99ECB349}" type="datetimeFigureOut">
+              <a:rPr kumimoji="1" lang="ja-JP" altLang="en-US" smtClean="0"/>
+              <a:t>2018/9/13</a:t>
+            </a:fld>
+            <a:endParaRPr kumimoji="1" lang="ja-JP" altLang="en-US"/>
+          </a:p>
+        </p:txBody>
+      </p:sp>
+      <p:sp>
+        <p:nvSpPr>
+          <p:cNvPr id="4" name="スライド イメージ プレースホルダー 3"/>
+          <p:cNvSpPr>
+            <a:spLocks noGrp="1" noRot="1" noChangeAspect="1"/>
+          </p:cNvSpPr>
+          <p:nvPr>
+            <p:ph type="sldImg" idx="2"/>
+          </p:nvPr>
+        </p:nvSpPr>
+        <p:spPr>
+          <a:xfrm>
+            <a:off x="685800" y="1143000"/>
+            <a:ext cx="5486400" cy="3086100"/>
+          </a:xfrm>
+          <a:prstGeom prst="rect">
+            <a:avLst/>
+          </a:prstGeom>
+          <a:noFill/>
+          <a:ln w="12700">
+            <a:solidFill>
+              <a:prstClr val="black"/>
+            </a:solidFill>
+          </a:ln>
+        </p:spPr>
+        <p:txBody>
+          <a:bodyPr vert="horz" lIns="91440" tIns="45720" rIns="91440" bIns="45720" rtlCol="0" anchor="ctr"/>
+          <a:lstStyle/>
+          <a:p>
+            <a:endParaRPr lang="ja-JP" altLang="en-US"/>
+          </a:p>
+        </p:txBody>
+      </p:sp>
+      <p:sp>
+        <p:nvSpPr>
+          <p:cNvPr id="5" name="ノート プレースホルダー 4"/>
+          <p:cNvSpPr>
+            <a:spLocks noGrp="1"/>
+          </p:cNvSpPr>
+          <p:nvPr>
+            <p:ph type="body" sz="quarter" idx="3"/>
+          </p:nvPr>
+        </p:nvSpPr>
+        <p:spPr>
+          <a:xfrm>
+            <a:off x="685800" y="4400550"/>
+            <a:ext cx="5486400" cy="3600450"/>
+          </a:xfrm>
+          <a:prstGeom prst="rect">
+            <a:avLst/>
+          </a:prstGeom>
+        </p:spPr>
+        <p:txBody>
+          <a:bodyPr vert="horz" lIns="91440" tIns="45720" rIns="91440" bIns="45720" rtlCol="0"/>
+          <a:lstStyle/>
+          <a:p>
+            <a:pPr lvl="0"/>
+            <a:r>
+              <a:rPr kumimoji="1" lang="ja-JP" altLang="en-US" smtClean="0"/>
+              <a:t>マスター テキストの書式設定</a:t>
+            </a:r>
+          </a:p>
+          <a:p>
+            <a:pPr lvl="1"/>
+            <a:r>
+              <a:rPr kumimoji="1" lang="ja-JP" altLang="en-US" smtClean="0"/>
+              <a:t>第 </a:t>
+            </a:r>
+            <a:r>
+              <a:rPr kumimoji="1" lang="en-US" altLang="ja-JP" smtClean="0"/>
+              <a:t>2 </a:t>
+            </a:r>
+            <a:r>
+              <a:rPr kumimoji="1" lang="ja-JP" altLang="en-US" smtClean="0"/>
+              <a:t>レベル</a:t>
+            </a:r>
+          </a:p>
+          <a:p>
+            <a:pPr lvl="2"/>
+            <a:r>
+              <a:rPr kumimoji="1" lang="ja-JP" altLang="en-US" smtClean="0"/>
+              <a:t>第 </a:t>
+            </a:r>
+            <a:r>
+              <a:rPr kumimoji="1" lang="en-US" altLang="ja-JP" smtClean="0"/>
+              <a:t>3 </a:t>
+            </a:r>
+            <a:r>
+              <a:rPr kumimoji="1" lang="ja-JP" altLang="en-US" smtClean="0"/>
+              <a:t>レベル</a:t>
+            </a:r>
+          </a:p>
+          <a:p>
+            <a:pPr lvl="3"/>
+            <a:r>
+              <a:rPr kumimoji="1" lang="ja-JP" altLang="en-US" smtClean="0"/>
+              <a:t>第 </a:t>
+            </a:r>
+            <a:r>
+              <a:rPr kumimoji="1" lang="en-US" altLang="ja-JP" smtClean="0"/>
+              <a:t>4 </a:t>
+            </a:r>
+            <a:r>
+              <a:rPr kumimoji="1" lang="ja-JP" altLang="en-US" smtClean="0"/>
+              <a:t>レベル</a:t>
+            </a:r>
+          </a:p>
+          <a:p>
+            <a:pPr lvl="4"/>
+            <a:r>
+              <a:rPr kumimoji="1" lang="ja-JP" altLang="en-US" smtClean="0"/>
+              <a:t>第 </a:t>
+            </a:r>
+            <a:r>
+              <a:rPr kumimoji="1" lang="en-US" altLang="ja-JP" smtClean="0"/>
+              <a:t>5 </a:t>
+            </a:r>
+            <a:r>
+              <a:rPr kumimoji="1" lang="ja-JP" altLang="en-US" smtClean="0"/>
+              <a:t>レベル</a:t>
+            </a:r>
+            <a:endParaRPr kumimoji="1" lang="ja-JP" altLang="en-US"/>
+          </a:p>
+        </p:txBody>
+      </p:sp>
+      <p:sp>
+        <p:nvSpPr>
+          <p:cNvPr id="6" name="フッター プレースホルダー 5"/>
+          <p:cNvSpPr>
+            <a:spLocks noGrp="1"/>
+          </p:cNvSpPr>
+          <p:nvPr>
+            <p:ph type="ftr" sz="quarter" idx="4"/>
+          </p:nvPr>
+        </p:nvSpPr>
+        <p:spPr>
+          <a:xfrm>
+            <a:off x="0" y="8685213"/>
+            <a:ext cx="2971800" cy="458787"/>
+          </a:xfrm>
+          <a:prstGeom prst="rect">
+            <a:avLst/>
+          </a:prstGeom>
+        </p:spPr>
+        <p:txBody>
+          <a:bodyPr vert="horz" lIns="91440" tIns="45720" rIns="91440" bIns="45720" rtlCol="0" anchor="b"/>
+          <a:lstStyle>
+            <a:lvl1pPr algn="l">
+              <a:defRPr sz="1200"/>
+            </a:lvl1pPr>
+          </a:lstStyle>
+          <a:p>
+            <a:endParaRPr kumimoji="1" lang="ja-JP" altLang="en-US"/>
+          </a:p>
+        </p:txBody>
+      </p:sp>
+      <p:sp>
+        <p:nvSpPr>
+          <p:cNvPr id="7" name="スライド番号プレースホルダー 6"/>
+          <p:cNvSpPr>
+            <a:spLocks noGrp="1"/>
+          </p:cNvSpPr>
+          <p:nvPr>
+            <p:ph type="sldNum" sz="quarter" idx="5"/>
+          </p:nvPr>
+        </p:nvSpPr>
+        <p:spPr>
+          <a:xfrm>
+            <a:off x="3884613" y="8685213"/>
+            <a:ext cx="2971800" cy="458787"/>
+          </a:xfrm>
+          <a:prstGeom prst="rect">
+            <a:avLst/>
+          </a:prstGeom>
+        </p:spPr>
+        <p:txBody>
+          <a:bodyPr vert="horz" lIns="91440" tIns="45720" rIns="91440" bIns="45720" rtlCol="0" anchor="b"/>
+          <a:lstStyle>
+            <a:lvl1pPr algn="r">
+              <a:defRPr sz="1200"/>
+            </a:lvl1pPr>
+          </a:lstStyle>
+          <a:p>
+            <a:fld id="{8BBB7221-A76A-C94F-8BB1-B1D6C06CEFB8}" type="slidenum">
+              <a:rPr kumimoji="1" lang="ja-JP" altLang="en-US" smtClean="0"/>
+              <a:t>‹#›</a:t>
+            </a:fld>
+            <a:endParaRPr kumimoji="1" lang="ja-JP" altLang="en-US"/>
+          </a:p>
+        </p:txBody>
+      </p:sp>
+    </p:spTree>
+    <p:extLst>
+      <p:ext uri="{BB962C8B-B14F-4D97-AF65-F5344CB8AC3E}">
+        <p14:creationId xmlns:p14="http://schemas.microsoft.com/office/powerpoint/2010/main" val="1844660134"/>
+      </p:ext>
+    </p:extLst>
+  </p:cSld>
+  <p:clrMap bg1="lt1" tx1="dk1" bg2="lt2" tx2="dk2" accent1="accent1" accent2="accent2" accent3="accent3" accent4="accent4" accent5="accent5" accent6="accent6" hlink="hlink" folHlink="folHlink"/>
+  <p:notesStyle>
+    <a:lvl1pPr marL="0" algn="l" defTabSz="914400" rtl="0" eaLnBrk="1" latinLnBrk="0" hangingPunct="1">
+      <a:defRPr kumimoji="1" sz="1200" kern="1200">
+        <a:solidFill>
+          <a:schemeClr val="tx1"/>
+        </a:solidFill>
+        <a:latin typeface="+mn-lt"/>
+        <a:ea typeface="+mn-ea"/>
+        <a:cs typeface="+mn-cs"/>
+      </a:defRPr>
+    </a:lvl1pPr>
+    <a:lvl2pPr marL="457200" algn="l" defTabSz="914400" rtl="0" eaLnBrk="1" latinLnBrk="0" hangingPunct="1">
+      <a:defRPr kumimoji="1" sz="1200" kern="1200">
+        <a:solidFill>
+          <a:schemeClr val="tx1"/>
+        </a:solidFill>
+        <a:latin typeface="+mn-lt"/>
+        <a:ea typeface="+mn-ea"/>
+        <a:cs typeface="+mn-cs"/>
+      </a:defRPr>
+    </a:lvl2pPr>
+    <a:lvl3pPr marL="914400" algn="l" defTabSz="914400" rtl="0" eaLnBrk="1" latinLnBrk="0" hangingPunct="1">
+      <a:defRPr kumimoji="1" sz="1200" kern="1200">
+        <a:solidFill>
+          <a:schemeClr val="tx1"/>
+        </a:solidFill>
+        <a:latin typeface="+mn-lt"/>
+        <a:ea typeface="+mn-ea"/>
+        <a:cs typeface="+mn-cs"/>
+      </a:defRPr>
+    </a:lvl3pPr>
+    <a:lvl4pPr marL="1371600" algn="l" defTabSz="914400" rtl="0" eaLnBrk="1" latinLnBrk="0" hangingPunct="1">
+      <a:defRPr kumimoji="1" sz="1200" kern="1200">
+        <a:solidFill>
+          <a:schemeClr val="tx1"/>
+        </a:solidFill>
+        <a:latin typeface="+mn-lt"/>
+        <a:ea typeface="+mn-ea"/>
+        <a:cs typeface="+mn-cs"/>
+      </a:defRPr>
+    </a:lvl4pPr>
+    <a:lvl5pPr marL="1828800" algn="l" defTabSz="914400" rtl="0" eaLnBrk="1" latinLnBrk="0" hangingPunct="1">
+      <a:defRPr kumimoji="1" sz="1200" kern="1200">
+        <a:solidFill>
+          <a:schemeClr val="tx1"/>
+        </a:solidFill>
+        <a:latin typeface="+mn-lt"/>
+        <a:ea typeface="+mn-ea"/>
+        <a:cs typeface="+mn-cs"/>
+      </a:defRPr>
+    </a:lvl5pPr>
+    <a:lvl6pPr marL="2286000" algn="l" defTabSz="914400" rtl="0" eaLnBrk="1" latinLnBrk="0" hangingPunct="1">
+      <a:defRPr kumimoji="1" sz="1200" kern="1200">
+        <a:solidFill>
+          <a:schemeClr val="tx1"/>
+        </a:solidFill>
+        <a:latin typeface="+mn-lt"/>
+        <a:ea typeface="+mn-ea"/>
+        <a:cs typeface="+mn-cs"/>
+      </a:defRPr>
+    </a:lvl6pPr>
+    <a:lvl7pPr marL="2743200" algn="l" defTabSz="914400" rtl="0" eaLnBrk="1" latinLnBrk="0" hangingPunct="1">
+      <a:defRPr kumimoji="1" sz="1200" kern="1200">
+        <a:solidFill>
+          <a:schemeClr val="tx1"/>
+        </a:solidFill>
+        <a:latin typeface="+mn-lt"/>
+        <a:ea typeface="+mn-ea"/>
+        <a:cs typeface="+mn-cs"/>
+      </a:defRPr>
+    </a:lvl7pPr>
+    <a:lvl8pPr marL="3200400" algn="l" defTabSz="914400" rtl="0" eaLnBrk="1" latinLnBrk="0" hangingPunct="1">
+      <a:defRPr kumimoji="1" sz="1200" kern="1200">
+        <a:solidFill>
+          <a:schemeClr val="tx1"/>
+        </a:solidFill>
+        <a:latin typeface="+mn-lt"/>
+        <a:ea typeface="+mn-ea"/>
+        <a:cs typeface="+mn-cs"/>
+      </a:defRPr>
+    </a:lvl8pPr>
+    <a:lvl9pPr marL="3657600" algn="l" defTabSz="914400" rtl="0" eaLnBrk="1" latinLnBrk="0" hangingPunct="1">
+      <a:defRPr kumimoji="1" sz="1200" kern="1200">
+        <a:solidFill>
+          <a:schemeClr val="tx1"/>
+        </a:solidFill>
+        <a:latin typeface="+mn-lt"/>
+        <a:ea typeface="+mn-ea"/>
+        <a:cs typeface="+mn-cs"/>
+      </a:defRPr>
+    </a:lvl9pPr>
+  </p:notesStyle>
+</p:notesMaster>
+</file>
+
 <file path=ppt/slideLayouts/slideLayout1.xml><?xml version="1.0" encoding="utf-8"?>
 <p:sldLayout xmlns:a="http://schemas.openxmlformats.org/drawingml/2006/main" xmlns:r="http://schemas.openxmlformats.org/officeDocument/2006/relationships" xmlns:p="http://schemas.openxmlformats.org/presentationml/2006/main" type="title" preserve="1">
   <p:cSld name="標題投影片">
@@ -249,7 +635,7 @@
           <a:p>
             <a:fld id="{88327989-09FB-4CBC-9C66-034CB613F9B1}" type="datetimeFigureOut">
               <a:rPr kumimoji="1" lang="ja-JP" altLang="en-US" smtClean="0"/>
-              <a:t>2018/9/6</a:t>
+              <a:t>2018/9/13</a:t>
             </a:fld>
             <a:endParaRPr kumimoji="1" lang="ja-JP" altLang="en-US"/>
           </a:p>
@@ -419,7 +805,7 @@
           <a:p>
             <a:fld id="{88327989-09FB-4CBC-9C66-034CB613F9B1}" type="datetimeFigureOut">
               <a:rPr kumimoji="1" lang="ja-JP" altLang="en-US" smtClean="0"/>
-              <a:t>2018/9/6</a:t>
+              <a:t>2018/9/13</a:t>
             </a:fld>
             <a:endParaRPr kumimoji="1" lang="ja-JP" altLang="en-US"/>
           </a:p>
@@ -599,7 +985,7 @@
           <a:p>
             <a:fld id="{88327989-09FB-4CBC-9C66-034CB613F9B1}" type="datetimeFigureOut">
               <a:rPr kumimoji="1" lang="ja-JP" altLang="en-US" smtClean="0"/>
-              <a:t>2018/9/6</a:t>
+              <a:t>2018/9/13</a:t>
             </a:fld>
             <a:endParaRPr kumimoji="1" lang="ja-JP" altLang="en-US"/>
           </a:p>
@@ -769,7 +1155,7 @@
           <a:p>
             <a:fld id="{88327989-09FB-4CBC-9C66-034CB613F9B1}" type="datetimeFigureOut">
               <a:rPr kumimoji="1" lang="ja-JP" altLang="en-US" smtClean="0"/>
-              <a:t>2018/9/6</a:t>
+              <a:t>2018/9/13</a:t>
             </a:fld>
             <a:endParaRPr kumimoji="1" lang="ja-JP" altLang="en-US"/>
           </a:p>
@@ -1015,7 +1401,7 @@
           <a:p>
             <a:fld id="{88327989-09FB-4CBC-9C66-034CB613F9B1}" type="datetimeFigureOut">
               <a:rPr kumimoji="1" lang="ja-JP" altLang="en-US" smtClean="0"/>
-              <a:t>2018/9/6</a:t>
+              <a:t>2018/9/13</a:t>
             </a:fld>
             <a:endParaRPr kumimoji="1" lang="ja-JP" altLang="en-US"/>
           </a:p>
@@ -1247,7 +1633,7 @@
           <a:p>
             <a:fld id="{88327989-09FB-4CBC-9C66-034CB613F9B1}" type="datetimeFigureOut">
               <a:rPr kumimoji="1" lang="ja-JP" altLang="en-US" smtClean="0"/>
-              <a:t>2018/9/6</a:t>
+              <a:t>2018/9/13</a:t>
             </a:fld>
             <a:endParaRPr kumimoji="1" lang="ja-JP" altLang="en-US"/>
           </a:p>
@@ -1614,7 +2000,7 @@
           <a:p>
             <a:fld id="{88327989-09FB-4CBC-9C66-034CB613F9B1}" type="datetimeFigureOut">
               <a:rPr kumimoji="1" lang="ja-JP" altLang="en-US" smtClean="0"/>
-              <a:t>2018/9/6</a:t>
+              <a:t>2018/9/13</a:t>
             </a:fld>
             <a:endParaRPr kumimoji="1" lang="ja-JP" altLang="en-US"/>
           </a:p>
@@ -1732,7 +2118,7 @@
           <a:p>
             <a:fld id="{88327989-09FB-4CBC-9C66-034CB613F9B1}" type="datetimeFigureOut">
               <a:rPr kumimoji="1" lang="ja-JP" altLang="en-US" smtClean="0"/>
-              <a:t>2018/9/6</a:t>
+              <a:t>2018/9/13</a:t>
             </a:fld>
             <a:endParaRPr kumimoji="1" lang="ja-JP" altLang="en-US"/>
           </a:p>
@@ -1827,7 +2213,7 @@
           <a:p>
             <a:fld id="{88327989-09FB-4CBC-9C66-034CB613F9B1}" type="datetimeFigureOut">
               <a:rPr kumimoji="1" lang="ja-JP" altLang="en-US" smtClean="0"/>
-              <a:t>2018/9/6</a:t>
+              <a:t>2018/9/13</a:t>
             </a:fld>
             <a:endParaRPr kumimoji="1" lang="ja-JP" altLang="en-US"/>
           </a:p>
@@ -2104,7 +2490,7 @@
           <a:p>
             <a:fld id="{88327989-09FB-4CBC-9C66-034CB613F9B1}" type="datetimeFigureOut">
               <a:rPr kumimoji="1" lang="ja-JP" altLang="en-US" smtClean="0"/>
-              <a:t>2018/9/6</a:t>
+              <a:t>2018/9/13</a:t>
             </a:fld>
             <a:endParaRPr kumimoji="1" lang="ja-JP" altLang="en-US"/>
           </a:p>
@@ -2357,7 +2743,7 @@
           <a:p>
             <a:fld id="{88327989-09FB-4CBC-9C66-034CB613F9B1}" type="datetimeFigureOut">
               <a:rPr kumimoji="1" lang="ja-JP" altLang="en-US" smtClean="0"/>
-              <a:t>2018/9/6</a:t>
+              <a:t>2018/9/13</a:t>
             </a:fld>
             <a:endParaRPr kumimoji="1" lang="ja-JP" altLang="en-US"/>
           </a:p>
@@ -2570,7 +2956,7 @@
           <a:p>
             <a:fld id="{88327989-09FB-4CBC-9C66-034CB613F9B1}" type="datetimeFigureOut">
               <a:rPr kumimoji="1" lang="ja-JP" altLang="en-US" smtClean="0"/>
-              <a:t>2018/9/6</a:t>
+              <a:t>2018/9/13</a:t>
             </a:fld>
             <a:endParaRPr kumimoji="1" lang="ja-JP" altLang="en-US"/>
           </a:p>
@@ -8244,54 +8630,85 @@
           <a:chExt cx="0" cy="0"/>
         </a:xfrm>
       </p:grpSpPr>
+      <p:cxnSp>
+        <p:nvCxnSpPr>
+          <p:cNvPr id="263" name="直線接點 262"/>
+          <p:cNvCxnSpPr/>
+          <p:nvPr/>
+        </p:nvCxnSpPr>
+        <p:spPr>
+          <a:xfrm flipV="1">
+            <a:off x="3741420" y="0"/>
+            <a:ext cx="5382260" cy="4472942"/>
+          </a:xfrm>
+          <a:prstGeom prst="line">
+            <a:avLst/>
+          </a:prstGeom>
+          <a:ln>
+            <a:prstDash val="dash"/>
+          </a:ln>
+        </p:spPr>
+        <p:style>
+          <a:lnRef idx="1">
+            <a:schemeClr val="dk1"/>
+          </a:lnRef>
+          <a:fillRef idx="0">
+            <a:schemeClr val="dk1"/>
+          </a:fillRef>
+          <a:effectRef idx="0">
+            <a:schemeClr val="dk1"/>
+          </a:effectRef>
+          <a:fontRef idx="minor">
+            <a:schemeClr val="tx1"/>
+          </a:fontRef>
+        </p:style>
+      </p:cxnSp>
       <p:pic>
         <p:nvPicPr>
-          <p:cNvPr id="4" name="圖片 3"/>
+          <p:cNvPr id="167" name="圖片 166"/>
           <p:cNvPicPr>
             <a:picLocks noChangeAspect="1"/>
           </p:cNvPicPr>
           <p:nvPr/>
         </p:nvPicPr>
         <p:blipFill>
-          <a:blip r:embed="rId2" cstate="print">
-            <a:extLst>
-              <a:ext uri="{28A0092B-C50C-407E-A947-70E740481C1C}">
-                <a14:useLocalDpi xmlns:a14="http://schemas.microsoft.com/office/drawing/2010/main" val="0"/>
-              </a:ext>
-            </a:extLst>
-          </a:blip>
+          <a:blip r:embed="rId2"/>
           <a:stretch>
             <a:fillRect/>
           </a:stretch>
         </p:blipFill>
         <p:spPr>
           <a:xfrm>
-            <a:off x="1363980" y="457844"/>
-            <a:ext cx="9772149" cy="5813416"/>
+            <a:off x="1261655" y="2102916"/>
+            <a:ext cx="5005250" cy="4694327"/>
           </a:xfrm>
           <a:prstGeom prst="rect">
             <a:avLst/>
           </a:prstGeom>
+          <a:noFill/>
+          <a:ln>
+            <a:noFill/>
+          </a:ln>
         </p:spPr>
       </p:pic>
       <p:sp>
         <p:nvSpPr>
-          <p:cNvPr id="7" name="矩形 6"/>
+          <p:cNvPr id="209" name="矩形 208"/>
           <p:cNvSpPr/>
           <p:nvPr/>
         </p:nvSpPr>
         <p:spPr>
           <a:xfrm>
-            <a:off x="10058400" y="601980"/>
-            <a:ext cx="708660" cy="335280"/>
+            <a:off x="2190915" y="1196009"/>
+            <a:ext cx="780222" cy="750404"/>
           </a:xfrm>
           <a:prstGeom prst="rect">
             <a:avLst/>
           </a:prstGeom>
           <a:noFill/>
-          <a:ln w="38100">
+          <a:ln>
             <a:solidFill>
-              <a:srgbClr val="C00000"/>
+              <a:schemeClr val="tx1"/>
             </a:solidFill>
           </a:ln>
         </p:spPr>
@@ -8316,174 +8733,1782 @@
           <a:lstStyle/>
           <a:p>
             <a:pPr algn="ctr"/>
-            <a:endParaRPr kumimoji="1" lang="ja-JP" altLang="en-US"/>
-          </a:p>
-        </p:txBody>
-      </p:sp>
-      <p:sp>
-        <p:nvSpPr>
-          <p:cNvPr id="9" name="文字方塊 8"/>
-          <p:cNvSpPr txBox="1"/>
-          <p:nvPr/>
-        </p:nvSpPr>
-        <p:spPr>
-          <a:xfrm>
-            <a:off x="5654040" y="1089660"/>
-            <a:ext cx="5113020" cy="1938992"/>
-          </a:xfrm>
-          <a:prstGeom prst="rect">
-            <a:avLst/>
-          </a:prstGeom>
-          <a:noFill/>
-        </p:spPr>
-        <p:txBody>
-          <a:bodyPr wrap="square" rtlCol="0">
-            <a:spAutoFit/>
-          </a:bodyPr>
-          <a:lstStyle/>
-          <a:p>
-            <a:r>
-              <a:rPr kumimoji="1" lang="en-US" altLang="ja-JP" sz="2400" dirty="0" smtClean="0">
-                <a:solidFill>
-                  <a:schemeClr val="bg1"/>
-                </a:solidFill>
-              </a:rPr>
-              <a:t>-a 4  </a:t>
-            </a:r>
-          </a:p>
-          <a:p>
-            <a:pPr marL="285750" indent="-285750">
-              <a:buFont typeface="Wingdings" panose="05000000000000000000" pitchFamily="2" charset="2"/>
-              <a:buChar char="à"/>
-            </a:pPr>
-            <a:r>
-              <a:rPr kumimoji="1" lang="en-US" altLang="ja-JP" sz="2400" dirty="0" smtClean="0">
-                <a:solidFill>
-                  <a:schemeClr val="accent2"/>
-                </a:solidFill>
-                <a:sym typeface="Wingdings" panose="05000000000000000000" pitchFamily="2" charset="2"/>
-              </a:rPr>
-              <a:t> Number of switches is 4*4 = 16 </a:t>
-            </a:r>
-          </a:p>
-          <a:p>
-            <a:pPr marL="285750" indent="-285750">
-              <a:buFont typeface="Wingdings" panose="05000000000000000000" pitchFamily="2" charset="2"/>
-              <a:buChar char="à"/>
-            </a:pPr>
-            <a:endParaRPr lang="en-US" altLang="ja-JP" sz="2400" dirty="0">
+            <a:r>
+              <a:rPr lang="ja-JP" altLang="en-US" dirty="0" smtClean="0">
+                <a:solidFill>
+                  <a:schemeClr val="tx1"/>
+                </a:solidFill>
+              </a:rPr>
+              <a:t>１６</a:t>
+            </a:r>
+            <a:endParaRPr kumimoji="1" lang="ja-JP" altLang="en-US" dirty="0">
               <a:solidFill>
-                <a:schemeClr val="accent2"/>
-              </a:solidFill>
-              <a:sym typeface="Wingdings" panose="05000000000000000000" pitchFamily="2" charset="2"/>
-            </a:endParaRPr>
-          </a:p>
-          <a:p>
-            <a:r>
-              <a:rPr kumimoji="1" lang="en-US" altLang="ja-JP" sz="2400" dirty="0" smtClean="0">
-                <a:solidFill>
-                  <a:schemeClr val="bg1"/>
-                </a:solidFill>
-                <a:sym typeface="Wingdings" panose="05000000000000000000" pitchFamily="2" charset="2"/>
-              </a:rPr>
-              <a:t>-T 0</a:t>
-            </a:r>
-          </a:p>
-          <a:p>
-            <a:r>
-              <a:rPr lang="en-US" altLang="ja-JP" sz="2400" dirty="0" smtClean="0">
-                <a:solidFill>
-                  <a:schemeClr val="accent2"/>
-                </a:solidFill>
-                <a:sym typeface="Wingdings" panose="05000000000000000000" pitchFamily="2" charset="2"/>
-              </a:rPr>
-              <a:t> 0 mesh, 1 torus</a:t>
-            </a:r>
-            <a:endParaRPr kumimoji="1" lang="ja-JP" altLang="en-US" sz="2400" dirty="0">
-              <a:solidFill>
-                <a:schemeClr val="accent2"/>
+                <a:schemeClr val="tx1"/>
               </a:solidFill>
             </a:endParaRPr>
           </a:p>
         </p:txBody>
       </p:sp>
+      <p:sp>
+        <p:nvSpPr>
+          <p:cNvPr id="210" name="矩形 209"/>
+          <p:cNvSpPr/>
+          <p:nvPr/>
+        </p:nvSpPr>
+        <p:spPr>
+          <a:xfrm>
+            <a:off x="3592995" y="1196009"/>
+            <a:ext cx="780222" cy="750404"/>
+          </a:xfrm>
+          <a:prstGeom prst="rect">
+            <a:avLst/>
+          </a:prstGeom>
+          <a:noFill/>
+          <a:ln>
+            <a:solidFill>
+              <a:schemeClr val="tx1"/>
+            </a:solidFill>
+          </a:ln>
+        </p:spPr>
+        <p:style>
+          <a:lnRef idx="2">
+            <a:schemeClr val="accent1">
+              <a:shade val="50000"/>
+            </a:schemeClr>
+          </a:lnRef>
+          <a:fillRef idx="1">
+            <a:schemeClr val="accent1"/>
+          </a:fillRef>
+          <a:effectRef idx="0">
+            <a:schemeClr val="accent1"/>
+          </a:effectRef>
+          <a:fontRef idx="minor">
+            <a:schemeClr val="lt1"/>
+          </a:fontRef>
+        </p:style>
+        <p:txBody>
+          <a:bodyPr rtlCol="0" anchor="ctr"/>
+          <a:lstStyle/>
+          <a:p>
+            <a:pPr algn="ctr"/>
+            <a:r>
+              <a:rPr lang="ja-JP" altLang="en-US" dirty="0" smtClean="0">
+                <a:solidFill>
+                  <a:schemeClr val="tx1"/>
+                </a:solidFill>
+              </a:rPr>
+              <a:t>１</a:t>
+            </a:r>
+            <a:r>
+              <a:rPr lang="ja-JP" altLang="en-US" dirty="0">
+                <a:solidFill>
+                  <a:schemeClr val="tx1"/>
+                </a:solidFill>
+              </a:rPr>
+              <a:t>７</a:t>
+            </a:r>
+            <a:endParaRPr kumimoji="1" lang="ja-JP" altLang="en-US" dirty="0">
+              <a:solidFill>
+                <a:schemeClr val="tx1"/>
+              </a:solidFill>
+            </a:endParaRPr>
+          </a:p>
+        </p:txBody>
+      </p:sp>
+      <p:sp>
+        <p:nvSpPr>
+          <p:cNvPr id="211" name="矩形 210"/>
+          <p:cNvSpPr/>
+          <p:nvPr/>
+        </p:nvSpPr>
+        <p:spPr>
+          <a:xfrm>
+            <a:off x="4995075" y="1196009"/>
+            <a:ext cx="780222" cy="750404"/>
+          </a:xfrm>
+          <a:prstGeom prst="rect">
+            <a:avLst/>
+          </a:prstGeom>
+          <a:noFill/>
+          <a:ln>
+            <a:solidFill>
+              <a:schemeClr val="tx1"/>
+            </a:solidFill>
+          </a:ln>
+        </p:spPr>
+        <p:style>
+          <a:lnRef idx="2">
+            <a:schemeClr val="accent1">
+              <a:shade val="50000"/>
+            </a:schemeClr>
+          </a:lnRef>
+          <a:fillRef idx="1">
+            <a:schemeClr val="accent1"/>
+          </a:fillRef>
+          <a:effectRef idx="0">
+            <a:schemeClr val="accent1"/>
+          </a:effectRef>
+          <a:fontRef idx="minor">
+            <a:schemeClr val="lt1"/>
+          </a:fontRef>
+        </p:style>
+        <p:txBody>
+          <a:bodyPr rtlCol="0" anchor="ctr"/>
+          <a:lstStyle/>
+          <a:p>
+            <a:pPr algn="ctr"/>
+            <a:r>
+              <a:rPr lang="ja-JP" altLang="en-US" dirty="0" smtClean="0">
+                <a:solidFill>
+                  <a:schemeClr val="tx1"/>
+                </a:solidFill>
+              </a:rPr>
+              <a:t>１</a:t>
+            </a:r>
+            <a:r>
+              <a:rPr lang="ja-JP" altLang="en-US" dirty="0">
+                <a:solidFill>
+                  <a:schemeClr val="tx1"/>
+                </a:solidFill>
+              </a:rPr>
+              <a:t>８</a:t>
+            </a:r>
+            <a:endParaRPr kumimoji="1" lang="ja-JP" altLang="en-US" dirty="0">
+              <a:solidFill>
+                <a:schemeClr val="tx1"/>
+              </a:solidFill>
+            </a:endParaRPr>
+          </a:p>
+        </p:txBody>
+      </p:sp>
+      <p:sp>
+        <p:nvSpPr>
+          <p:cNvPr id="212" name="矩形 211"/>
+          <p:cNvSpPr/>
+          <p:nvPr/>
+        </p:nvSpPr>
+        <p:spPr>
+          <a:xfrm>
+            <a:off x="6402621" y="1196009"/>
+            <a:ext cx="780222" cy="750404"/>
+          </a:xfrm>
+          <a:prstGeom prst="rect">
+            <a:avLst/>
+          </a:prstGeom>
+          <a:noFill/>
+          <a:ln>
+            <a:solidFill>
+              <a:schemeClr val="tx1"/>
+            </a:solidFill>
+          </a:ln>
+        </p:spPr>
+        <p:style>
+          <a:lnRef idx="2">
+            <a:schemeClr val="accent1">
+              <a:shade val="50000"/>
+            </a:schemeClr>
+          </a:lnRef>
+          <a:fillRef idx="1">
+            <a:schemeClr val="accent1"/>
+          </a:fillRef>
+          <a:effectRef idx="0">
+            <a:schemeClr val="accent1"/>
+          </a:effectRef>
+          <a:fontRef idx="minor">
+            <a:schemeClr val="lt1"/>
+          </a:fontRef>
+        </p:style>
+        <p:txBody>
+          <a:bodyPr rtlCol="0" anchor="ctr"/>
+          <a:lstStyle/>
+          <a:p>
+            <a:pPr algn="ctr"/>
+            <a:r>
+              <a:rPr lang="ja-JP" altLang="en-US" dirty="0" smtClean="0">
+                <a:solidFill>
+                  <a:schemeClr val="tx1"/>
+                </a:solidFill>
+              </a:rPr>
+              <a:t>１</a:t>
+            </a:r>
+            <a:r>
+              <a:rPr lang="ja-JP" altLang="en-US" dirty="0">
+                <a:solidFill>
+                  <a:schemeClr val="tx1"/>
+                </a:solidFill>
+              </a:rPr>
+              <a:t>９</a:t>
+            </a:r>
+            <a:endParaRPr kumimoji="1" lang="ja-JP" altLang="en-US" dirty="0">
+              <a:solidFill>
+                <a:schemeClr val="tx1"/>
+              </a:solidFill>
+            </a:endParaRPr>
+          </a:p>
+        </p:txBody>
+      </p:sp>
+      <p:sp>
+        <p:nvSpPr>
+          <p:cNvPr id="216" name="矩形 215"/>
+          <p:cNvSpPr/>
+          <p:nvPr/>
+        </p:nvSpPr>
+        <p:spPr>
+          <a:xfrm>
+            <a:off x="6402621" y="2506649"/>
+            <a:ext cx="780222" cy="750404"/>
+          </a:xfrm>
+          <a:prstGeom prst="rect">
+            <a:avLst/>
+          </a:prstGeom>
+          <a:noFill/>
+          <a:ln>
+            <a:solidFill>
+              <a:schemeClr val="tx1"/>
+            </a:solidFill>
+          </a:ln>
+        </p:spPr>
+        <p:style>
+          <a:lnRef idx="2">
+            <a:schemeClr val="accent1">
+              <a:shade val="50000"/>
+            </a:schemeClr>
+          </a:lnRef>
+          <a:fillRef idx="1">
+            <a:schemeClr val="accent1"/>
+          </a:fillRef>
+          <a:effectRef idx="0">
+            <a:schemeClr val="accent1"/>
+          </a:effectRef>
+          <a:fontRef idx="minor">
+            <a:schemeClr val="lt1"/>
+          </a:fontRef>
+        </p:style>
+        <p:txBody>
+          <a:bodyPr rtlCol="0" anchor="ctr"/>
+          <a:lstStyle/>
+          <a:p>
+            <a:pPr algn="ctr"/>
+            <a:r>
+              <a:rPr lang="ja-JP" altLang="en-US" dirty="0" smtClean="0">
+                <a:solidFill>
+                  <a:schemeClr val="tx1"/>
+                </a:solidFill>
+              </a:rPr>
+              <a:t>２</a:t>
+            </a:r>
+            <a:r>
+              <a:rPr lang="ja-JP" altLang="en-US" dirty="0">
+                <a:solidFill>
+                  <a:schemeClr val="tx1"/>
+                </a:solidFill>
+              </a:rPr>
+              <a:t>３</a:t>
+            </a:r>
+            <a:endParaRPr kumimoji="1" lang="ja-JP" altLang="en-US" dirty="0">
+              <a:solidFill>
+                <a:schemeClr val="tx1"/>
+              </a:solidFill>
+            </a:endParaRPr>
+          </a:p>
+        </p:txBody>
+      </p:sp>
+      <p:sp>
+        <p:nvSpPr>
+          <p:cNvPr id="220" name="矩形 219"/>
+          <p:cNvSpPr/>
+          <p:nvPr/>
+        </p:nvSpPr>
+        <p:spPr>
+          <a:xfrm>
+            <a:off x="6402621" y="3817289"/>
+            <a:ext cx="780222" cy="750404"/>
+          </a:xfrm>
+          <a:prstGeom prst="rect">
+            <a:avLst/>
+          </a:prstGeom>
+          <a:noFill/>
+          <a:ln>
+            <a:solidFill>
+              <a:schemeClr val="tx1"/>
+            </a:solidFill>
+          </a:ln>
+        </p:spPr>
+        <p:style>
+          <a:lnRef idx="2">
+            <a:schemeClr val="accent1">
+              <a:shade val="50000"/>
+            </a:schemeClr>
+          </a:lnRef>
+          <a:fillRef idx="1">
+            <a:schemeClr val="accent1"/>
+          </a:fillRef>
+          <a:effectRef idx="0">
+            <a:schemeClr val="accent1"/>
+          </a:effectRef>
+          <a:fontRef idx="minor">
+            <a:schemeClr val="lt1"/>
+          </a:fontRef>
+        </p:style>
+        <p:txBody>
+          <a:bodyPr rtlCol="0" anchor="ctr"/>
+          <a:lstStyle/>
+          <a:p>
+            <a:pPr algn="ctr"/>
+            <a:r>
+              <a:rPr lang="ja-JP" altLang="en-US" dirty="0" smtClean="0">
+                <a:solidFill>
+                  <a:schemeClr val="tx1"/>
+                </a:solidFill>
+              </a:rPr>
+              <a:t>２</a:t>
+            </a:r>
+            <a:r>
+              <a:rPr lang="ja-JP" altLang="en-US" dirty="0">
+                <a:solidFill>
+                  <a:schemeClr val="tx1"/>
+                </a:solidFill>
+              </a:rPr>
+              <a:t>７</a:t>
+            </a:r>
+            <a:endParaRPr kumimoji="1" lang="ja-JP" altLang="en-US" dirty="0">
+              <a:solidFill>
+                <a:schemeClr val="tx1"/>
+              </a:solidFill>
+            </a:endParaRPr>
+          </a:p>
+        </p:txBody>
+      </p:sp>
+      <p:sp>
+        <p:nvSpPr>
+          <p:cNvPr id="224" name="矩形 223"/>
+          <p:cNvSpPr/>
+          <p:nvPr/>
+        </p:nvSpPr>
+        <p:spPr>
+          <a:xfrm>
+            <a:off x="6401958" y="5127929"/>
+            <a:ext cx="780222" cy="750404"/>
+          </a:xfrm>
+          <a:prstGeom prst="rect">
+            <a:avLst/>
+          </a:prstGeom>
+          <a:noFill/>
+          <a:ln>
+            <a:solidFill>
+              <a:schemeClr val="tx1"/>
+            </a:solidFill>
+          </a:ln>
+        </p:spPr>
+        <p:style>
+          <a:lnRef idx="2">
+            <a:schemeClr val="accent1">
+              <a:shade val="50000"/>
+            </a:schemeClr>
+          </a:lnRef>
+          <a:fillRef idx="1">
+            <a:schemeClr val="accent1"/>
+          </a:fillRef>
+          <a:effectRef idx="0">
+            <a:schemeClr val="accent1"/>
+          </a:effectRef>
+          <a:fontRef idx="minor">
+            <a:schemeClr val="lt1"/>
+          </a:fontRef>
+        </p:style>
+        <p:txBody>
+          <a:bodyPr rtlCol="0" anchor="ctr"/>
+          <a:lstStyle/>
+          <a:p>
+            <a:pPr algn="ctr"/>
+            <a:r>
+              <a:rPr lang="ja-JP" altLang="en-US" dirty="0" smtClean="0">
+                <a:solidFill>
+                  <a:schemeClr val="tx1"/>
+                </a:solidFill>
+              </a:rPr>
+              <a:t>３</a:t>
+            </a:r>
+            <a:r>
+              <a:rPr lang="ja-JP" altLang="en-US" dirty="0">
+                <a:solidFill>
+                  <a:schemeClr val="tx1"/>
+                </a:solidFill>
+              </a:rPr>
+              <a:t>１</a:t>
+            </a:r>
+            <a:endParaRPr kumimoji="1" lang="ja-JP" altLang="en-US" dirty="0">
+              <a:solidFill>
+                <a:schemeClr val="tx1"/>
+              </a:solidFill>
+            </a:endParaRPr>
+          </a:p>
+        </p:txBody>
+      </p:sp>
       <p:cxnSp>
         <p:nvCxnSpPr>
-          <p:cNvPr id="11" name="直線接點 10"/>
-          <p:cNvCxnSpPr/>
+          <p:cNvPr id="225" name="直線接點 224"/>
+          <p:cNvCxnSpPr>
+            <a:stCxn id="209" idx="3"/>
+            <a:endCxn id="210" idx="1"/>
+          </p:cNvCxnSpPr>
           <p:nvPr/>
         </p:nvCxnSpPr>
         <p:spPr>
           <a:xfrm>
-            <a:off x="1623060" y="6164580"/>
-            <a:ext cx="3025140" cy="7620"/>
+            <a:off x="2971137" y="1571211"/>
+            <a:ext cx="621858" cy="0"/>
           </a:xfrm>
           <a:prstGeom prst="line">
             <a:avLst/>
           </a:prstGeom>
-          <a:ln w="38100">
+          <a:ln w="12700"/>
+        </p:spPr>
+        <p:style>
+          <a:lnRef idx="1">
+            <a:schemeClr val="dk1"/>
+          </a:lnRef>
+          <a:fillRef idx="0">
+            <a:schemeClr val="dk1"/>
+          </a:fillRef>
+          <a:effectRef idx="0">
+            <a:schemeClr val="dk1"/>
+          </a:effectRef>
+          <a:fontRef idx="minor">
+            <a:schemeClr val="tx1"/>
+          </a:fontRef>
+        </p:style>
+      </p:cxnSp>
+      <p:cxnSp>
+        <p:nvCxnSpPr>
+          <p:cNvPr id="226" name="直線接點 225"/>
+          <p:cNvCxnSpPr>
+            <a:stCxn id="210" idx="3"/>
+            <a:endCxn id="211" idx="1"/>
+          </p:cNvCxnSpPr>
+          <p:nvPr/>
+        </p:nvCxnSpPr>
+        <p:spPr>
+          <a:xfrm>
+            <a:off x="4373217" y="1571211"/>
+            <a:ext cx="621858" cy="0"/>
+          </a:xfrm>
+          <a:prstGeom prst="line">
+            <a:avLst/>
+          </a:prstGeom>
+          <a:ln w="12700"/>
+        </p:spPr>
+        <p:style>
+          <a:lnRef idx="1">
+            <a:schemeClr val="dk1"/>
+          </a:lnRef>
+          <a:fillRef idx="0">
+            <a:schemeClr val="dk1"/>
+          </a:fillRef>
+          <a:effectRef idx="0">
+            <a:schemeClr val="dk1"/>
+          </a:effectRef>
+          <a:fontRef idx="minor">
+            <a:schemeClr val="tx1"/>
+          </a:fontRef>
+        </p:style>
+      </p:cxnSp>
+      <p:cxnSp>
+        <p:nvCxnSpPr>
+          <p:cNvPr id="227" name="直線接點 226"/>
+          <p:cNvCxnSpPr>
+            <a:stCxn id="212" idx="1"/>
+            <a:endCxn id="211" idx="3"/>
+          </p:cNvCxnSpPr>
+          <p:nvPr/>
+        </p:nvCxnSpPr>
+        <p:spPr>
+          <a:xfrm flipH="1">
+            <a:off x="5775297" y="1571211"/>
+            <a:ext cx="627324" cy="0"/>
+          </a:xfrm>
+          <a:prstGeom prst="line">
+            <a:avLst/>
+          </a:prstGeom>
+          <a:ln w="12700"/>
+        </p:spPr>
+        <p:style>
+          <a:lnRef idx="1">
+            <a:schemeClr val="dk1"/>
+          </a:lnRef>
+          <a:fillRef idx="0">
+            <a:schemeClr val="dk1"/>
+          </a:fillRef>
+          <a:effectRef idx="0">
+            <a:schemeClr val="dk1"/>
+          </a:effectRef>
+          <a:fontRef idx="minor">
+            <a:schemeClr val="tx1"/>
+          </a:fontRef>
+        </p:style>
+      </p:cxnSp>
+      <p:cxnSp>
+        <p:nvCxnSpPr>
+          <p:cNvPr id="228" name="直線接點 227"/>
+          <p:cNvCxnSpPr>
+            <a:stCxn id="216" idx="0"/>
+            <a:endCxn id="212" idx="2"/>
+          </p:cNvCxnSpPr>
+          <p:nvPr/>
+        </p:nvCxnSpPr>
+        <p:spPr>
+          <a:xfrm flipV="1">
+            <a:off x="6792732" y="1946413"/>
+            <a:ext cx="0" cy="560236"/>
+          </a:xfrm>
+          <a:prstGeom prst="line">
+            <a:avLst/>
+          </a:prstGeom>
+          <a:ln w="12700"/>
+        </p:spPr>
+        <p:style>
+          <a:lnRef idx="1">
+            <a:schemeClr val="dk1"/>
+          </a:lnRef>
+          <a:fillRef idx="0">
+            <a:schemeClr val="dk1"/>
+          </a:fillRef>
+          <a:effectRef idx="0">
+            <a:schemeClr val="dk1"/>
+          </a:effectRef>
+          <a:fontRef idx="minor">
+            <a:schemeClr val="tx1"/>
+          </a:fontRef>
+        </p:style>
+      </p:cxnSp>
+      <p:cxnSp>
+        <p:nvCxnSpPr>
+          <p:cNvPr id="237" name="直線接點 236"/>
+          <p:cNvCxnSpPr>
+            <a:stCxn id="220" idx="0"/>
+            <a:endCxn id="216" idx="2"/>
+          </p:cNvCxnSpPr>
+          <p:nvPr/>
+        </p:nvCxnSpPr>
+        <p:spPr>
+          <a:xfrm flipV="1">
+            <a:off x="6792732" y="3257053"/>
+            <a:ext cx="0" cy="560236"/>
+          </a:xfrm>
+          <a:prstGeom prst="line">
+            <a:avLst/>
+          </a:prstGeom>
+          <a:ln w="12700"/>
+        </p:spPr>
+        <p:style>
+          <a:lnRef idx="1">
+            <a:schemeClr val="dk1"/>
+          </a:lnRef>
+          <a:fillRef idx="0">
+            <a:schemeClr val="dk1"/>
+          </a:fillRef>
+          <a:effectRef idx="0">
+            <a:schemeClr val="dk1"/>
+          </a:effectRef>
+          <a:fontRef idx="minor">
+            <a:schemeClr val="tx1"/>
+          </a:fontRef>
+        </p:style>
+      </p:cxnSp>
+      <p:cxnSp>
+        <p:nvCxnSpPr>
+          <p:cNvPr id="238" name="直線接點 237"/>
+          <p:cNvCxnSpPr>
+            <a:stCxn id="224" idx="0"/>
+            <a:endCxn id="220" idx="2"/>
+          </p:cNvCxnSpPr>
+          <p:nvPr/>
+        </p:nvCxnSpPr>
+        <p:spPr>
+          <a:xfrm flipV="1">
+            <a:off x="6792069" y="4567693"/>
+            <a:ext cx="663" cy="560236"/>
+          </a:xfrm>
+          <a:prstGeom prst="line">
+            <a:avLst/>
+          </a:prstGeom>
+          <a:ln w="12700"/>
+        </p:spPr>
+        <p:style>
+          <a:lnRef idx="1">
+            <a:schemeClr val="dk1"/>
+          </a:lnRef>
+          <a:fillRef idx="0">
+            <a:schemeClr val="dk1"/>
+          </a:fillRef>
+          <a:effectRef idx="0">
+            <a:schemeClr val="dk1"/>
+          </a:effectRef>
+          <a:fontRef idx="minor">
+            <a:schemeClr val="tx1"/>
+          </a:fontRef>
+        </p:style>
+      </p:cxnSp>
+      <p:sp>
+        <p:nvSpPr>
+          <p:cNvPr id="249" name="矩形 248"/>
+          <p:cNvSpPr/>
+          <p:nvPr/>
+        </p:nvSpPr>
+        <p:spPr>
+          <a:xfrm>
+            <a:off x="3149083" y="266369"/>
+            <a:ext cx="780222" cy="750404"/>
+          </a:xfrm>
+          <a:prstGeom prst="rect">
+            <a:avLst/>
+          </a:prstGeom>
+          <a:noFill/>
+          <a:ln>
             <a:solidFill>
-              <a:srgbClr val="C00000"/>
+              <a:schemeClr val="tx1"/>
             </a:solidFill>
           </a:ln>
         </p:spPr>
         <p:style>
-          <a:lnRef idx="1">
-            <a:schemeClr val="accent1"/>
-          </a:lnRef>
-          <a:fillRef idx="0">
-            <a:schemeClr val="accent1"/>
-          </a:fillRef>
-          <a:effectRef idx="0">
-            <a:schemeClr val="accent1"/>
-          </a:effectRef>
-          <a:fontRef idx="minor">
-            <a:schemeClr val="tx1"/>
-          </a:fontRef>
-        </p:style>
-      </p:cxnSp>
-      <p:sp>
-        <p:nvSpPr>
-          <p:cNvPr id="12" name="文字方塊 11"/>
-          <p:cNvSpPr txBox="1"/>
-          <p:nvPr/>
-        </p:nvSpPr>
-        <p:spPr>
-          <a:xfrm>
-            <a:off x="5135880" y="5269528"/>
-            <a:ext cx="4686300" cy="830997"/>
-          </a:xfrm>
-          <a:prstGeom prst="rect">
-            <a:avLst/>
-          </a:prstGeom>
-          <a:noFill/>
-        </p:spPr>
-        <p:txBody>
-          <a:bodyPr wrap="square" rtlCol="0">
-            <a:spAutoFit/>
-          </a:bodyPr>
-          <a:lstStyle/>
-          <a:p>
-            <a:r>
-              <a:rPr kumimoji="1" lang="en-US" altLang="ja-JP" sz="2400" dirty="0" smtClean="0">
-                <a:solidFill>
-                  <a:schemeClr val="bg1"/>
-                </a:solidFill>
-              </a:rPr>
-              <a:t>Routing table for each switch is generated in output/</a:t>
-            </a:r>
-            <a:endParaRPr kumimoji="1" lang="ja-JP" altLang="en-US" sz="2400" dirty="0">
+          <a:lnRef idx="2">
+            <a:schemeClr val="accent1">
+              <a:shade val="50000"/>
+            </a:schemeClr>
+          </a:lnRef>
+          <a:fillRef idx="1">
+            <a:schemeClr val="accent1"/>
+          </a:fillRef>
+          <a:effectRef idx="0">
+            <a:schemeClr val="accent1"/>
+          </a:effectRef>
+          <a:fontRef idx="minor">
+            <a:schemeClr val="lt1"/>
+          </a:fontRef>
+        </p:style>
+        <p:txBody>
+          <a:bodyPr rtlCol="0" anchor="ctr"/>
+          <a:lstStyle/>
+          <a:p>
+            <a:pPr algn="ctr"/>
+            <a:r>
+              <a:rPr lang="ja-JP" altLang="en-US" dirty="0" smtClean="0">
+                <a:solidFill>
+                  <a:schemeClr val="tx1"/>
+                </a:solidFill>
+              </a:rPr>
+              <a:t>３</a:t>
+            </a:r>
+            <a:r>
+              <a:rPr lang="ja-JP" altLang="en-US" dirty="0">
+                <a:solidFill>
+                  <a:schemeClr val="tx1"/>
+                </a:solidFill>
+              </a:rPr>
+              <a:t>２</a:t>
+            </a:r>
+            <a:endParaRPr kumimoji="1" lang="ja-JP" altLang="en-US" dirty="0">
               <a:solidFill>
-                <a:schemeClr val="accent2"/>
+                <a:schemeClr val="tx1"/>
               </a:solidFill>
             </a:endParaRPr>
           </a:p>
         </p:txBody>
       </p:sp>
+      <p:sp>
+        <p:nvSpPr>
+          <p:cNvPr id="250" name="矩形 249"/>
+          <p:cNvSpPr/>
+          <p:nvPr/>
+        </p:nvSpPr>
+        <p:spPr>
+          <a:xfrm>
+            <a:off x="4551163" y="266369"/>
+            <a:ext cx="780222" cy="750404"/>
+          </a:xfrm>
+          <a:prstGeom prst="rect">
+            <a:avLst/>
+          </a:prstGeom>
+          <a:noFill/>
+          <a:ln>
+            <a:solidFill>
+              <a:schemeClr val="tx1"/>
+            </a:solidFill>
+          </a:ln>
+        </p:spPr>
+        <p:style>
+          <a:lnRef idx="2">
+            <a:schemeClr val="accent1">
+              <a:shade val="50000"/>
+            </a:schemeClr>
+          </a:lnRef>
+          <a:fillRef idx="1">
+            <a:schemeClr val="accent1"/>
+          </a:fillRef>
+          <a:effectRef idx="0">
+            <a:schemeClr val="accent1"/>
+          </a:effectRef>
+          <a:fontRef idx="minor">
+            <a:schemeClr val="lt1"/>
+          </a:fontRef>
+        </p:style>
+        <p:txBody>
+          <a:bodyPr rtlCol="0" anchor="ctr"/>
+          <a:lstStyle/>
+          <a:p>
+            <a:pPr algn="ctr"/>
+            <a:r>
+              <a:rPr lang="ja-JP" altLang="en-US" dirty="0" smtClean="0">
+                <a:solidFill>
+                  <a:schemeClr val="tx1"/>
+                </a:solidFill>
+              </a:rPr>
+              <a:t>３</a:t>
+            </a:r>
+            <a:r>
+              <a:rPr lang="ja-JP" altLang="en-US" dirty="0">
+                <a:solidFill>
+                  <a:schemeClr val="tx1"/>
+                </a:solidFill>
+              </a:rPr>
+              <a:t>３</a:t>
+            </a:r>
+            <a:endParaRPr kumimoji="1" lang="ja-JP" altLang="en-US" dirty="0">
+              <a:solidFill>
+                <a:schemeClr val="tx1"/>
+              </a:solidFill>
+            </a:endParaRPr>
+          </a:p>
+        </p:txBody>
+      </p:sp>
+      <p:sp>
+        <p:nvSpPr>
+          <p:cNvPr id="251" name="矩形 250"/>
+          <p:cNvSpPr/>
+          <p:nvPr/>
+        </p:nvSpPr>
+        <p:spPr>
+          <a:xfrm>
+            <a:off x="5953243" y="266369"/>
+            <a:ext cx="780222" cy="750404"/>
+          </a:xfrm>
+          <a:prstGeom prst="rect">
+            <a:avLst/>
+          </a:prstGeom>
+          <a:noFill/>
+          <a:ln>
+            <a:solidFill>
+              <a:schemeClr val="tx1"/>
+            </a:solidFill>
+          </a:ln>
+        </p:spPr>
+        <p:style>
+          <a:lnRef idx="2">
+            <a:schemeClr val="accent1">
+              <a:shade val="50000"/>
+            </a:schemeClr>
+          </a:lnRef>
+          <a:fillRef idx="1">
+            <a:schemeClr val="accent1"/>
+          </a:fillRef>
+          <a:effectRef idx="0">
+            <a:schemeClr val="accent1"/>
+          </a:effectRef>
+          <a:fontRef idx="minor">
+            <a:schemeClr val="lt1"/>
+          </a:fontRef>
+        </p:style>
+        <p:txBody>
+          <a:bodyPr rtlCol="0" anchor="ctr"/>
+          <a:lstStyle/>
+          <a:p>
+            <a:pPr algn="ctr"/>
+            <a:r>
+              <a:rPr lang="ja-JP" altLang="en-US" dirty="0" smtClean="0">
+                <a:solidFill>
+                  <a:schemeClr val="tx1"/>
+                </a:solidFill>
+              </a:rPr>
+              <a:t>３</a:t>
+            </a:r>
+            <a:r>
+              <a:rPr lang="ja-JP" altLang="en-US" dirty="0">
+                <a:solidFill>
+                  <a:schemeClr val="tx1"/>
+                </a:solidFill>
+              </a:rPr>
+              <a:t>４</a:t>
+            </a:r>
+            <a:endParaRPr kumimoji="1" lang="ja-JP" altLang="en-US" dirty="0">
+              <a:solidFill>
+                <a:schemeClr val="tx1"/>
+              </a:solidFill>
+            </a:endParaRPr>
+          </a:p>
+        </p:txBody>
+      </p:sp>
+      <p:sp>
+        <p:nvSpPr>
+          <p:cNvPr id="252" name="矩形 251"/>
+          <p:cNvSpPr/>
+          <p:nvPr/>
+        </p:nvSpPr>
+        <p:spPr>
+          <a:xfrm>
+            <a:off x="7360789" y="266369"/>
+            <a:ext cx="780222" cy="750404"/>
+          </a:xfrm>
+          <a:prstGeom prst="rect">
+            <a:avLst/>
+          </a:prstGeom>
+          <a:noFill/>
+          <a:ln>
+            <a:solidFill>
+              <a:schemeClr val="tx1"/>
+            </a:solidFill>
+          </a:ln>
+        </p:spPr>
+        <p:style>
+          <a:lnRef idx="2">
+            <a:schemeClr val="accent1">
+              <a:shade val="50000"/>
+            </a:schemeClr>
+          </a:lnRef>
+          <a:fillRef idx="1">
+            <a:schemeClr val="accent1"/>
+          </a:fillRef>
+          <a:effectRef idx="0">
+            <a:schemeClr val="accent1"/>
+          </a:effectRef>
+          <a:fontRef idx="minor">
+            <a:schemeClr val="lt1"/>
+          </a:fontRef>
+        </p:style>
+        <p:txBody>
+          <a:bodyPr rtlCol="0" anchor="ctr"/>
+          <a:lstStyle/>
+          <a:p>
+            <a:pPr algn="ctr"/>
+            <a:r>
+              <a:rPr lang="ja-JP" altLang="en-US" dirty="0" smtClean="0">
+                <a:solidFill>
+                  <a:schemeClr val="tx1"/>
+                </a:solidFill>
+              </a:rPr>
+              <a:t>３</a:t>
+            </a:r>
+            <a:r>
+              <a:rPr lang="ja-JP" altLang="en-US" dirty="0">
+                <a:solidFill>
+                  <a:schemeClr val="tx1"/>
+                </a:solidFill>
+              </a:rPr>
+              <a:t>５</a:t>
+            </a:r>
+            <a:endParaRPr kumimoji="1" lang="ja-JP" altLang="en-US" dirty="0">
+              <a:solidFill>
+                <a:schemeClr val="tx1"/>
+              </a:solidFill>
+            </a:endParaRPr>
+          </a:p>
+        </p:txBody>
+      </p:sp>
+      <p:sp>
+        <p:nvSpPr>
+          <p:cNvPr id="253" name="矩形 252"/>
+          <p:cNvSpPr/>
+          <p:nvPr/>
+        </p:nvSpPr>
+        <p:spPr>
+          <a:xfrm>
+            <a:off x="7360789" y="1577009"/>
+            <a:ext cx="780222" cy="750404"/>
+          </a:xfrm>
+          <a:prstGeom prst="rect">
+            <a:avLst/>
+          </a:prstGeom>
+          <a:noFill/>
+          <a:ln>
+            <a:solidFill>
+              <a:schemeClr val="tx1"/>
+            </a:solidFill>
+          </a:ln>
+        </p:spPr>
+        <p:style>
+          <a:lnRef idx="2">
+            <a:schemeClr val="accent1">
+              <a:shade val="50000"/>
+            </a:schemeClr>
+          </a:lnRef>
+          <a:fillRef idx="1">
+            <a:schemeClr val="accent1"/>
+          </a:fillRef>
+          <a:effectRef idx="0">
+            <a:schemeClr val="accent1"/>
+          </a:effectRef>
+          <a:fontRef idx="minor">
+            <a:schemeClr val="lt1"/>
+          </a:fontRef>
+        </p:style>
+        <p:txBody>
+          <a:bodyPr rtlCol="0" anchor="ctr"/>
+          <a:lstStyle/>
+          <a:p>
+            <a:pPr algn="ctr"/>
+            <a:r>
+              <a:rPr lang="ja-JP" altLang="en-US" dirty="0" smtClean="0">
+                <a:solidFill>
+                  <a:schemeClr val="tx1"/>
+                </a:solidFill>
+              </a:rPr>
+              <a:t>３</a:t>
+            </a:r>
+            <a:r>
+              <a:rPr lang="ja-JP" altLang="en-US" dirty="0">
+                <a:solidFill>
+                  <a:schemeClr val="tx1"/>
+                </a:solidFill>
+              </a:rPr>
+              <a:t>９</a:t>
+            </a:r>
+            <a:endParaRPr kumimoji="1" lang="ja-JP" altLang="en-US" dirty="0">
+              <a:solidFill>
+                <a:schemeClr val="tx1"/>
+              </a:solidFill>
+            </a:endParaRPr>
+          </a:p>
+        </p:txBody>
+      </p:sp>
+      <p:sp>
+        <p:nvSpPr>
+          <p:cNvPr id="254" name="矩形 253"/>
+          <p:cNvSpPr/>
+          <p:nvPr/>
+        </p:nvSpPr>
+        <p:spPr>
+          <a:xfrm>
+            <a:off x="7360789" y="2887649"/>
+            <a:ext cx="780222" cy="750404"/>
+          </a:xfrm>
+          <a:prstGeom prst="rect">
+            <a:avLst/>
+          </a:prstGeom>
+          <a:noFill/>
+          <a:ln>
+            <a:solidFill>
+              <a:schemeClr val="tx1"/>
+            </a:solidFill>
+          </a:ln>
+        </p:spPr>
+        <p:style>
+          <a:lnRef idx="2">
+            <a:schemeClr val="accent1">
+              <a:shade val="50000"/>
+            </a:schemeClr>
+          </a:lnRef>
+          <a:fillRef idx="1">
+            <a:schemeClr val="accent1"/>
+          </a:fillRef>
+          <a:effectRef idx="0">
+            <a:schemeClr val="accent1"/>
+          </a:effectRef>
+          <a:fontRef idx="minor">
+            <a:schemeClr val="lt1"/>
+          </a:fontRef>
+        </p:style>
+        <p:txBody>
+          <a:bodyPr rtlCol="0" anchor="ctr"/>
+          <a:lstStyle/>
+          <a:p>
+            <a:pPr algn="ctr"/>
+            <a:r>
+              <a:rPr lang="ja-JP" altLang="en-US" dirty="0" smtClean="0">
+                <a:solidFill>
+                  <a:schemeClr val="tx1"/>
+                </a:solidFill>
+              </a:rPr>
+              <a:t>４</a:t>
+            </a:r>
+            <a:r>
+              <a:rPr lang="ja-JP" altLang="en-US" dirty="0">
+                <a:solidFill>
+                  <a:schemeClr val="tx1"/>
+                </a:solidFill>
+              </a:rPr>
+              <a:t>３</a:t>
+            </a:r>
+            <a:endParaRPr kumimoji="1" lang="ja-JP" altLang="en-US" dirty="0">
+              <a:solidFill>
+                <a:schemeClr val="tx1"/>
+              </a:solidFill>
+            </a:endParaRPr>
+          </a:p>
+        </p:txBody>
+      </p:sp>
+      <p:sp>
+        <p:nvSpPr>
+          <p:cNvPr id="255" name="矩形 254"/>
+          <p:cNvSpPr/>
+          <p:nvPr/>
+        </p:nvSpPr>
+        <p:spPr>
+          <a:xfrm>
+            <a:off x="7360126" y="4198289"/>
+            <a:ext cx="780222" cy="750404"/>
+          </a:xfrm>
+          <a:prstGeom prst="rect">
+            <a:avLst/>
+          </a:prstGeom>
+          <a:noFill/>
+          <a:ln>
+            <a:solidFill>
+              <a:schemeClr val="tx1"/>
+            </a:solidFill>
+          </a:ln>
+        </p:spPr>
+        <p:style>
+          <a:lnRef idx="2">
+            <a:schemeClr val="accent1">
+              <a:shade val="50000"/>
+            </a:schemeClr>
+          </a:lnRef>
+          <a:fillRef idx="1">
+            <a:schemeClr val="accent1"/>
+          </a:fillRef>
+          <a:effectRef idx="0">
+            <a:schemeClr val="accent1"/>
+          </a:effectRef>
+          <a:fontRef idx="minor">
+            <a:schemeClr val="lt1"/>
+          </a:fontRef>
+        </p:style>
+        <p:txBody>
+          <a:bodyPr rtlCol="0" anchor="ctr"/>
+          <a:lstStyle/>
+          <a:p>
+            <a:pPr algn="ctr"/>
+            <a:r>
+              <a:rPr lang="ja-JP" altLang="en-US" dirty="0" smtClean="0">
+                <a:solidFill>
+                  <a:schemeClr val="tx1"/>
+                </a:solidFill>
+              </a:rPr>
+              <a:t>４</a:t>
+            </a:r>
+            <a:r>
+              <a:rPr lang="ja-JP" altLang="en-US" dirty="0">
+                <a:solidFill>
+                  <a:schemeClr val="tx1"/>
+                </a:solidFill>
+              </a:rPr>
+              <a:t>７</a:t>
+            </a:r>
+            <a:endParaRPr kumimoji="1" lang="ja-JP" altLang="en-US" dirty="0">
+              <a:solidFill>
+                <a:schemeClr val="tx1"/>
+              </a:solidFill>
+            </a:endParaRPr>
+          </a:p>
+        </p:txBody>
+      </p:sp>
+      <p:cxnSp>
+        <p:nvCxnSpPr>
+          <p:cNvPr id="256" name="直線接點 255"/>
+          <p:cNvCxnSpPr>
+            <a:stCxn id="249" idx="3"/>
+            <a:endCxn id="250" idx="1"/>
+          </p:cNvCxnSpPr>
+          <p:nvPr/>
+        </p:nvCxnSpPr>
+        <p:spPr>
+          <a:xfrm>
+            <a:off x="3929305" y="641571"/>
+            <a:ext cx="621858" cy="0"/>
+          </a:xfrm>
+          <a:prstGeom prst="line">
+            <a:avLst/>
+          </a:prstGeom>
+          <a:ln w="12700"/>
+        </p:spPr>
+        <p:style>
+          <a:lnRef idx="1">
+            <a:schemeClr val="dk1"/>
+          </a:lnRef>
+          <a:fillRef idx="0">
+            <a:schemeClr val="dk1"/>
+          </a:fillRef>
+          <a:effectRef idx="0">
+            <a:schemeClr val="dk1"/>
+          </a:effectRef>
+          <a:fontRef idx="minor">
+            <a:schemeClr val="tx1"/>
+          </a:fontRef>
+        </p:style>
+      </p:cxnSp>
+      <p:cxnSp>
+        <p:nvCxnSpPr>
+          <p:cNvPr id="257" name="直線接點 256"/>
+          <p:cNvCxnSpPr>
+            <a:stCxn id="250" idx="3"/>
+            <a:endCxn id="251" idx="1"/>
+          </p:cNvCxnSpPr>
+          <p:nvPr/>
+        </p:nvCxnSpPr>
+        <p:spPr>
+          <a:xfrm>
+            <a:off x="5331385" y="641571"/>
+            <a:ext cx="621858" cy="0"/>
+          </a:xfrm>
+          <a:prstGeom prst="line">
+            <a:avLst/>
+          </a:prstGeom>
+          <a:ln w="12700"/>
+        </p:spPr>
+        <p:style>
+          <a:lnRef idx="1">
+            <a:schemeClr val="dk1"/>
+          </a:lnRef>
+          <a:fillRef idx="0">
+            <a:schemeClr val="dk1"/>
+          </a:fillRef>
+          <a:effectRef idx="0">
+            <a:schemeClr val="dk1"/>
+          </a:effectRef>
+          <a:fontRef idx="minor">
+            <a:schemeClr val="tx1"/>
+          </a:fontRef>
+        </p:style>
+      </p:cxnSp>
+      <p:cxnSp>
+        <p:nvCxnSpPr>
+          <p:cNvPr id="258" name="直線接點 257"/>
+          <p:cNvCxnSpPr>
+            <a:stCxn id="252" idx="1"/>
+            <a:endCxn id="251" idx="3"/>
+          </p:cNvCxnSpPr>
+          <p:nvPr/>
+        </p:nvCxnSpPr>
+        <p:spPr>
+          <a:xfrm flipH="1">
+            <a:off x="6733465" y="641571"/>
+            <a:ext cx="627324" cy="0"/>
+          </a:xfrm>
+          <a:prstGeom prst="line">
+            <a:avLst/>
+          </a:prstGeom>
+          <a:ln w="12700"/>
+        </p:spPr>
+        <p:style>
+          <a:lnRef idx="1">
+            <a:schemeClr val="dk1"/>
+          </a:lnRef>
+          <a:fillRef idx="0">
+            <a:schemeClr val="dk1"/>
+          </a:fillRef>
+          <a:effectRef idx="0">
+            <a:schemeClr val="dk1"/>
+          </a:effectRef>
+          <a:fontRef idx="minor">
+            <a:schemeClr val="tx1"/>
+          </a:fontRef>
+        </p:style>
+      </p:cxnSp>
+      <p:cxnSp>
+        <p:nvCxnSpPr>
+          <p:cNvPr id="259" name="直線接點 258"/>
+          <p:cNvCxnSpPr>
+            <a:stCxn id="253" idx="0"/>
+            <a:endCxn id="252" idx="2"/>
+          </p:cNvCxnSpPr>
+          <p:nvPr/>
+        </p:nvCxnSpPr>
+        <p:spPr>
+          <a:xfrm flipV="1">
+            <a:off x="7750900" y="1016773"/>
+            <a:ext cx="0" cy="560236"/>
+          </a:xfrm>
+          <a:prstGeom prst="line">
+            <a:avLst/>
+          </a:prstGeom>
+          <a:ln w="12700"/>
+        </p:spPr>
+        <p:style>
+          <a:lnRef idx="1">
+            <a:schemeClr val="dk1"/>
+          </a:lnRef>
+          <a:fillRef idx="0">
+            <a:schemeClr val="dk1"/>
+          </a:fillRef>
+          <a:effectRef idx="0">
+            <a:schemeClr val="dk1"/>
+          </a:effectRef>
+          <a:fontRef idx="minor">
+            <a:schemeClr val="tx1"/>
+          </a:fontRef>
+        </p:style>
+      </p:cxnSp>
+      <p:cxnSp>
+        <p:nvCxnSpPr>
+          <p:cNvPr id="260" name="直線接點 259"/>
+          <p:cNvCxnSpPr>
+            <a:stCxn id="254" idx="0"/>
+            <a:endCxn id="253" idx="2"/>
+          </p:cNvCxnSpPr>
+          <p:nvPr/>
+        </p:nvCxnSpPr>
+        <p:spPr>
+          <a:xfrm flipV="1">
+            <a:off x="7750900" y="2327413"/>
+            <a:ext cx="0" cy="560236"/>
+          </a:xfrm>
+          <a:prstGeom prst="line">
+            <a:avLst/>
+          </a:prstGeom>
+          <a:ln w="12700"/>
+        </p:spPr>
+        <p:style>
+          <a:lnRef idx="1">
+            <a:schemeClr val="dk1"/>
+          </a:lnRef>
+          <a:fillRef idx="0">
+            <a:schemeClr val="dk1"/>
+          </a:fillRef>
+          <a:effectRef idx="0">
+            <a:schemeClr val="dk1"/>
+          </a:effectRef>
+          <a:fontRef idx="minor">
+            <a:schemeClr val="tx1"/>
+          </a:fontRef>
+        </p:style>
+      </p:cxnSp>
+      <p:cxnSp>
+        <p:nvCxnSpPr>
+          <p:cNvPr id="261" name="直線接點 260"/>
+          <p:cNvCxnSpPr>
+            <a:stCxn id="255" idx="0"/>
+            <a:endCxn id="254" idx="2"/>
+          </p:cNvCxnSpPr>
+          <p:nvPr/>
+        </p:nvCxnSpPr>
+        <p:spPr>
+          <a:xfrm flipV="1">
+            <a:off x="7750237" y="3638053"/>
+            <a:ext cx="663" cy="560236"/>
+          </a:xfrm>
+          <a:prstGeom prst="line">
+            <a:avLst/>
+          </a:prstGeom>
+          <a:ln w="12700"/>
+        </p:spPr>
+        <p:style>
+          <a:lnRef idx="1">
+            <a:schemeClr val="dk1"/>
+          </a:lnRef>
+          <a:fillRef idx="0">
+            <a:schemeClr val="dk1"/>
+          </a:fillRef>
+          <a:effectRef idx="0">
+            <a:schemeClr val="dk1"/>
+          </a:effectRef>
+          <a:fontRef idx="minor">
+            <a:schemeClr val="tx1"/>
+          </a:fontRef>
+        </p:style>
+      </p:cxnSp>
+      <p:cxnSp>
+        <p:nvCxnSpPr>
+          <p:cNvPr id="3" name="直線コネクタ 2"/>
+          <p:cNvCxnSpPr/>
+          <p:nvPr/>
+        </p:nvCxnSpPr>
+        <p:spPr>
+          <a:xfrm flipV="1">
+            <a:off x="2032000" y="1788160"/>
+            <a:ext cx="426720" cy="314756"/>
+          </a:xfrm>
+          <a:prstGeom prst="line">
+            <a:avLst/>
+          </a:prstGeom>
+          <a:ln w="12700">
+            <a:solidFill>
+              <a:schemeClr val="tx1"/>
+            </a:solidFill>
+          </a:ln>
+        </p:spPr>
+        <p:style>
+          <a:lnRef idx="1">
+            <a:schemeClr val="accent1"/>
+          </a:lnRef>
+          <a:fillRef idx="0">
+            <a:schemeClr val="accent1"/>
+          </a:fillRef>
+          <a:effectRef idx="0">
+            <a:schemeClr val="accent1"/>
+          </a:effectRef>
+          <a:fontRef idx="minor">
+            <a:schemeClr val="tx1"/>
+          </a:fontRef>
+        </p:style>
+      </p:cxnSp>
+      <p:cxnSp>
+        <p:nvCxnSpPr>
+          <p:cNvPr id="33" name="直線コネクタ 32"/>
+          <p:cNvCxnSpPr/>
+          <p:nvPr/>
+        </p:nvCxnSpPr>
+        <p:spPr>
+          <a:xfrm flipV="1">
+            <a:off x="2952832" y="901112"/>
+            <a:ext cx="426720" cy="314756"/>
+          </a:xfrm>
+          <a:prstGeom prst="line">
+            <a:avLst/>
+          </a:prstGeom>
+          <a:ln w="12700">
+            <a:solidFill>
+              <a:schemeClr val="tx1"/>
+            </a:solidFill>
+          </a:ln>
+        </p:spPr>
+        <p:style>
+          <a:lnRef idx="1">
+            <a:schemeClr val="accent1"/>
+          </a:lnRef>
+          <a:fillRef idx="0">
+            <a:schemeClr val="accent1"/>
+          </a:fillRef>
+          <a:effectRef idx="0">
+            <a:schemeClr val="accent1"/>
+          </a:effectRef>
+          <a:fontRef idx="minor">
+            <a:schemeClr val="tx1"/>
+          </a:fontRef>
+        </p:style>
+      </p:cxnSp>
+      <p:cxnSp>
+        <p:nvCxnSpPr>
+          <p:cNvPr id="34" name="直線コネクタ 33"/>
+          <p:cNvCxnSpPr/>
+          <p:nvPr/>
+        </p:nvCxnSpPr>
+        <p:spPr>
+          <a:xfrm flipV="1">
+            <a:off x="3442446" y="1788160"/>
+            <a:ext cx="426720" cy="314756"/>
+          </a:xfrm>
+          <a:prstGeom prst="line">
+            <a:avLst/>
+          </a:prstGeom>
+          <a:ln w="12700">
+            <a:solidFill>
+              <a:schemeClr val="tx1"/>
+            </a:solidFill>
+          </a:ln>
+        </p:spPr>
+        <p:style>
+          <a:lnRef idx="1">
+            <a:schemeClr val="accent1"/>
+          </a:lnRef>
+          <a:fillRef idx="0">
+            <a:schemeClr val="accent1"/>
+          </a:fillRef>
+          <a:effectRef idx="0">
+            <a:schemeClr val="accent1"/>
+          </a:effectRef>
+          <a:fontRef idx="minor">
+            <a:schemeClr val="tx1"/>
+          </a:fontRef>
+        </p:style>
+      </p:cxnSp>
+      <p:cxnSp>
+        <p:nvCxnSpPr>
+          <p:cNvPr id="35" name="直線コネクタ 34"/>
+          <p:cNvCxnSpPr/>
+          <p:nvPr/>
+        </p:nvCxnSpPr>
+        <p:spPr>
+          <a:xfrm flipV="1">
+            <a:off x="4363278" y="901112"/>
+            <a:ext cx="426720" cy="314756"/>
+          </a:xfrm>
+          <a:prstGeom prst="line">
+            <a:avLst/>
+          </a:prstGeom>
+          <a:ln w="12700">
+            <a:solidFill>
+              <a:schemeClr val="tx1"/>
+            </a:solidFill>
+          </a:ln>
+        </p:spPr>
+        <p:style>
+          <a:lnRef idx="1">
+            <a:schemeClr val="accent1"/>
+          </a:lnRef>
+          <a:fillRef idx="0">
+            <a:schemeClr val="accent1"/>
+          </a:fillRef>
+          <a:effectRef idx="0">
+            <a:schemeClr val="accent1"/>
+          </a:effectRef>
+          <a:fontRef idx="minor">
+            <a:schemeClr val="tx1"/>
+          </a:fontRef>
+        </p:style>
+      </p:cxnSp>
+      <p:cxnSp>
+        <p:nvCxnSpPr>
+          <p:cNvPr id="36" name="直線コネクタ 35"/>
+          <p:cNvCxnSpPr/>
+          <p:nvPr/>
+        </p:nvCxnSpPr>
+        <p:spPr>
+          <a:xfrm flipV="1">
+            <a:off x="4857341" y="1808454"/>
+            <a:ext cx="426720" cy="314756"/>
+          </a:xfrm>
+          <a:prstGeom prst="line">
+            <a:avLst/>
+          </a:prstGeom>
+          <a:ln w="12700">
+            <a:solidFill>
+              <a:schemeClr val="tx1"/>
+            </a:solidFill>
+          </a:ln>
+        </p:spPr>
+        <p:style>
+          <a:lnRef idx="1">
+            <a:schemeClr val="accent1"/>
+          </a:lnRef>
+          <a:fillRef idx="0">
+            <a:schemeClr val="accent1"/>
+          </a:fillRef>
+          <a:effectRef idx="0">
+            <a:schemeClr val="accent1"/>
+          </a:effectRef>
+          <a:fontRef idx="minor">
+            <a:schemeClr val="tx1"/>
+          </a:fontRef>
+        </p:style>
+      </p:cxnSp>
+      <p:cxnSp>
+        <p:nvCxnSpPr>
+          <p:cNvPr id="37" name="直線コネクタ 36"/>
+          <p:cNvCxnSpPr/>
+          <p:nvPr/>
+        </p:nvCxnSpPr>
+        <p:spPr>
+          <a:xfrm flipV="1">
+            <a:off x="5778173" y="921406"/>
+            <a:ext cx="426720" cy="314756"/>
+          </a:xfrm>
+          <a:prstGeom prst="line">
+            <a:avLst/>
+          </a:prstGeom>
+          <a:ln w="12700">
+            <a:solidFill>
+              <a:schemeClr val="tx1"/>
+            </a:solidFill>
+          </a:ln>
+        </p:spPr>
+        <p:style>
+          <a:lnRef idx="1">
+            <a:schemeClr val="accent1"/>
+          </a:lnRef>
+          <a:fillRef idx="0">
+            <a:schemeClr val="accent1"/>
+          </a:fillRef>
+          <a:effectRef idx="0">
+            <a:schemeClr val="accent1"/>
+          </a:effectRef>
+          <a:fontRef idx="minor">
+            <a:schemeClr val="tx1"/>
+          </a:fontRef>
+        </p:style>
+      </p:cxnSp>
+      <p:cxnSp>
+        <p:nvCxnSpPr>
+          <p:cNvPr id="39" name="直線コネクタ 38"/>
+          <p:cNvCxnSpPr/>
+          <p:nvPr/>
+        </p:nvCxnSpPr>
+        <p:spPr>
+          <a:xfrm flipV="1">
+            <a:off x="6248634" y="1795063"/>
+            <a:ext cx="426720" cy="314756"/>
+          </a:xfrm>
+          <a:prstGeom prst="line">
+            <a:avLst/>
+          </a:prstGeom>
+          <a:ln w="12700">
+            <a:solidFill>
+              <a:schemeClr val="tx1"/>
+            </a:solidFill>
+          </a:ln>
+        </p:spPr>
+        <p:style>
+          <a:lnRef idx="1">
+            <a:schemeClr val="accent1"/>
+          </a:lnRef>
+          <a:fillRef idx="0">
+            <a:schemeClr val="accent1"/>
+          </a:fillRef>
+          <a:effectRef idx="0">
+            <a:schemeClr val="accent1"/>
+          </a:effectRef>
+          <a:fontRef idx="minor">
+            <a:schemeClr val="tx1"/>
+          </a:fontRef>
+        </p:style>
+      </p:cxnSp>
+      <p:cxnSp>
+        <p:nvCxnSpPr>
+          <p:cNvPr id="40" name="直線コネクタ 39"/>
+          <p:cNvCxnSpPr/>
+          <p:nvPr/>
+        </p:nvCxnSpPr>
+        <p:spPr>
+          <a:xfrm flipV="1">
+            <a:off x="7169466" y="908015"/>
+            <a:ext cx="426720" cy="314756"/>
+          </a:xfrm>
+          <a:prstGeom prst="line">
+            <a:avLst/>
+          </a:prstGeom>
+          <a:ln w="12700">
+            <a:solidFill>
+              <a:schemeClr val="tx1"/>
+            </a:solidFill>
+          </a:ln>
+        </p:spPr>
+        <p:style>
+          <a:lnRef idx="1">
+            <a:schemeClr val="accent1"/>
+          </a:lnRef>
+          <a:fillRef idx="0">
+            <a:schemeClr val="accent1"/>
+          </a:fillRef>
+          <a:effectRef idx="0">
+            <a:schemeClr val="accent1"/>
+          </a:effectRef>
+          <a:fontRef idx="minor">
+            <a:schemeClr val="tx1"/>
+          </a:fontRef>
+        </p:style>
+      </p:cxnSp>
+      <p:cxnSp>
+        <p:nvCxnSpPr>
+          <p:cNvPr id="41" name="直線コネクタ 40"/>
+          <p:cNvCxnSpPr/>
+          <p:nvPr/>
+        </p:nvCxnSpPr>
+        <p:spPr>
+          <a:xfrm flipV="1">
+            <a:off x="6261348" y="3105703"/>
+            <a:ext cx="426720" cy="314756"/>
+          </a:xfrm>
+          <a:prstGeom prst="line">
+            <a:avLst/>
+          </a:prstGeom>
+          <a:ln w="12700">
+            <a:solidFill>
+              <a:schemeClr val="tx1"/>
+            </a:solidFill>
+          </a:ln>
+        </p:spPr>
+        <p:style>
+          <a:lnRef idx="1">
+            <a:schemeClr val="accent1"/>
+          </a:lnRef>
+          <a:fillRef idx="0">
+            <a:schemeClr val="accent1"/>
+          </a:fillRef>
+          <a:effectRef idx="0">
+            <a:schemeClr val="accent1"/>
+          </a:effectRef>
+          <a:fontRef idx="minor">
+            <a:schemeClr val="tx1"/>
+          </a:fontRef>
+        </p:style>
+      </p:cxnSp>
+      <p:cxnSp>
+        <p:nvCxnSpPr>
+          <p:cNvPr id="42" name="直線コネクタ 41"/>
+          <p:cNvCxnSpPr/>
+          <p:nvPr/>
+        </p:nvCxnSpPr>
+        <p:spPr>
+          <a:xfrm flipV="1">
+            <a:off x="7182180" y="2218655"/>
+            <a:ext cx="426720" cy="314756"/>
+          </a:xfrm>
+          <a:prstGeom prst="line">
+            <a:avLst/>
+          </a:prstGeom>
+          <a:ln w="12700">
+            <a:solidFill>
+              <a:schemeClr val="tx1"/>
+            </a:solidFill>
+          </a:ln>
+        </p:spPr>
+        <p:style>
+          <a:lnRef idx="1">
+            <a:schemeClr val="accent1"/>
+          </a:lnRef>
+          <a:fillRef idx="0">
+            <a:schemeClr val="accent1"/>
+          </a:fillRef>
+          <a:effectRef idx="0">
+            <a:schemeClr val="accent1"/>
+          </a:effectRef>
+          <a:fontRef idx="minor">
+            <a:schemeClr val="tx1"/>
+          </a:fontRef>
+        </p:style>
+      </p:cxnSp>
+      <p:cxnSp>
+        <p:nvCxnSpPr>
+          <p:cNvPr id="43" name="直線コネクタ 42"/>
+          <p:cNvCxnSpPr/>
+          <p:nvPr/>
+        </p:nvCxnSpPr>
+        <p:spPr>
+          <a:xfrm flipV="1">
+            <a:off x="6245314" y="4416343"/>
+            <a:ext cx="426720" cy="314756"/>
+          </a:xfrm>
+          <a:prstGeom prst="line">
+            <a:avLst/>
+          </a:prstGeom>
+          <a:ln w="12700">
+            <a:solidFill>
+              <a:schemeClr val="tx1"/>
+            </a:solidFill>
+          </a:ln>
+        </p:spPr>
+        <p:style>
+          <a:lnRef idx="1">
+            <a:schemeClr val="accent1"/>
+          </a:lnRef>
+          <a:fillRef idx="0">
+            <a:schemeClr val="accent1"/>
+          </a:fillRef>
+          <a:effectRef idx="0">
+            <a:schemeClr val="accent1"/>
+          </a:effectRef>
+          <a:fontRef idx="minor">
+            <a:schemeClr val="tx1"/>
+          </a:fontRef>
+        </p:style>
+      </p:cxnSp>
+      <p:cxnSp>
+        <p:nvCxnSpPr>
+          <p:cNvPr id="44" name="直線コネクタ 43"/>
+          <p:cNvCxnSpPr/>
+          <p:nvPr/>
+        </p:nvCxnSpPr>
+        <p:spPr>
+          <a:xfrm flipV="1">
+            <a:off x="7166146" y="3529295"/>
+            <a:ext cx="426720" cy="314756"/>
+          </a:xfrm>
+          <a:prstGeom prst="line">
+            <a:avLst/>
+          </a:prstGeom>
+          <a:ln w="12700">
+            <a:solidFill>
+              <a:schemeClr val="tx1"/>
+            </a:solidFill>
+          </a:ln>
+        </p:spPr>
+        <p:style>
+          <a:lnRef idx="1">
+            <a:schemeClr val="accent1"/>
+          </a:lnRef>
+          <a:fillRef idx="0">
+            <a:schemeClr val="accent1"/>
+          </a:fillRef>
+          <a:effectRef idx="0">
+            <a:schemeClr val="accent1"/>
+          </a:effectRef>
+          <a:fontRef idx="minor">
+            <a:schemeClr val="tx1"/>
+          </a:fontRef>
+        </p:style>
+      </p:cxnSp>
+      <p:cxnSp>
+        <p:nvCxnSpPr>
+          <p:cNvPr id="45" name="直線コネクタ 44"/>
+          <p:cNvCxnSpPr/>
+          <p:nvPr/>
+        </p:nvCxnSpPr>
+        <p:spPr>
+          <a:xfrm flipV="1">
+            <a:off x="6245314" y="5746819"/>
+            <a:ext cx="426720" cy="314756"/>
+          </a:xfrm>
+          <a:prstGeom prst="line">
+            <a:avLst/>
+          </a:prstGeom>
+          <a:ln w="12700">
+            <a:solidFill>
+              <a:schemeClr val="tx1"/>
+            </a:solidFill>
+          </a:ln>
+        </p:spPr>
+        <p:style>
+          <a:lnRef idx="1">
+            <a:schemeClr val="accent1"/>
+          </a:lnRef>
+          <a:fillRef idx="0">
+            <a:schemeClr val="accent1"/>
+          </a:fillRef>
+          <a:effectRef idx="0">
+            <a:schemeClr val="accent1"/>
+          </a:effectRef>
+          <a:fontRef idx="minor">
+            <a:schemeClr val="tx1"/>
+          </a:fontRef>
+        </p:style>
+      </p:cxnSp>
+      <p:cxnSp>
+        <p:nvCxnSpPr>
+          <p:cNvPr id="46" name="直線コネクタ 45"/>
+          <p:cNvCxnSpPr/>
+          <p:nvPr/>
+        </p:nvCxnSpPr>
+        <p:spPr>
+          <a:xfrm flipV="1">
+            <a:off x="7166146" y="4859771"/>
+            <a:ext cx="426720" cy="314756"/>
+          </a:xfrm>
+          <a:prstGeom prst="line">
+            <a:avLst/>
+          </a:prstGeom>
+          <a:ln w="12700">
+            <a:solidFill>
+              <a:schemeClr val="tx1"/>
+            </a:solidFill>
+          </a:ln>
+        </p:spPr>
+        <p:style>
+          <a:lnRef idx="1">
+            <a:schemeClr val="accent1"/>
+          </a:lnRef>
+          <a:fillRef idx="0">
+            <a:schemeClr val="accent1"/>
+          </a:fillRef>
+          <a:effectRef idx="0">
+            <a:schemeClr val="accent1"/>
+          </a:effectRef>
+          <a:fontRef idx="minor">
+            <a:schemeClr val="tx1"/>
+          </a:fontRef>
+        </p:style>
+      </p:cxnSp>
     </p:spTree>
     <p:extLst>
       <p:ext uri="{BB962C8B-B14F-4D97-AF65-F5344CB8AC3E}">
-        <p14:creationId xmlns:p14="http://schemas.microsoft.com/office/powerpoint/2010/main" val="123539632"/>
+        <p14:creationId xmlns:p14="http://schemas.microsoft.com/office/powerpoint/2010/main" val="2128944046"/>
       </p:ext>
     </p:extLst>
   </p:cSld>
@@ -8519,6 +10544,272 @@
           <p:nvPr/>
         </p:nvPicPr>
         <p:blipFill>
+          <a:blip r:embed="rId2" cstate="print">
+            <a:extLst>
+              <a:ext uri="{28A0092B-C50C-407E-A947-70E740481C1C}">
+                <a14:useLocalDpi xmlns:a14="http://schemas.microsoft.com/office/drawing/2010/main" val="0"/>
+              </a:ext>
+            </a:extLst>
+          </a:blip>
+          <a:stretch>
+            <a:fillRect/>
+          </a:stretch>
+        </p:blipFill>
+        <p:spPr>
+          <a:xfrm>
+            <a:off x="1363980" y="457844"/>
+            <a:ext cx="9772149" cy="5813416"/>
+          </a:xfrm>
+          <a:prstGeom prst="rect">
+            <a:avLst/>
+          </a:prstGeom>
+        </p:spPr>
+      </p:pic>
+      <p:sp>
+        <p:nvSpPr>
+          <p:cNvPr id="7" name="矩形 6"/>
+          <p:cNvSpPr/>
+          <p:nvPr/>
+        </p:nvSpPr>
+        <p:spPr>
+          <a:xfrm>
+            <a:off x="10058400" y="601980"/>
+            <a:ext cx="708660" cy="335280"/>
+          </a:xfrm>
+          <a:prstGeom prst="rect">
+            <a:avLst/>
+          </a:prstGeom>
+          <a:noFill/>
+          <a:ln w="38100">
+            <a:solidFill>
+              <a:srgbClr val="C00000"/>
+            </a:solidFill>
+          </a:ln>
+        </p:spPr>
+        <p:style>
+          <a:lnRef idx="2">
+            <a:schemeClr val="accent1">
+              <a:shade val="50000"/>
+            </a:schemeClr>
+          </a:lnRef>
+          <a:fillRef idx="1">
+            <a:schemeClr val="accent1"/>
+          </a:fillRef>
+          <a:effectRef idx="0">
+            <a:schemeClr val="accent1"/>
+          </a:effectRef>
+          <a:fontRef idx="minor">
+            <a:schemeClr val="lt1"/>
+          </a:fontRef>
+        </p:style>
+        <p:txBody>
+          <a:bodyPr rtlCol="0" anchor="ctr"/>
+          <a:lstStyle/>
+          <a:p>
+            <a:pPr algn="ctr"/>
+            <a:endParaRPr kumimoji="1" lang="ja-JP" altLang="en-US"/>
+          </a:p>
+        </p:txBody>
+      </p:sp>
+      <p:sp>
+        <p:nvSpPr>
+          <p:cNvPr id="9" name="文字方塊 8"/>
+          <p:cNvSpPr txBox="1"/>
+          <p:nvPr/>
+        </p:nvSpPr>
+        <p:spPr>
+          <a:xfrm>
+            <a:off x="5654040" y="1089660"/>
+            <a:ext cx="5113020" cy="1938992"/>
+          </a:xfrm>
+          <a:prstGeom prst="rect">
+            <a:avLst/>
+          </a:prstGeom>
+          <a:noFill/>
+        </p:spPr>
+        <p:txBody>
+          <a:bodyPr wrap="square" rtlCol="0">
+            <a:spAutoFit/>
+          </a:bodyPr>
+          <a:lstStyle/>
+          <a:p>
+            <a:r>
+              <a:rPr kumimoji="1" lang="en-US" altLang="ja-JP" sz="2400" dirty="0" smtClean="0">
+                <a:solidFill>
+                  <a:schemeClr val="bg1"/>
+                </a:solidFill>
+              </a:rPr>
+              <a:t>-a 4  </a:t>
+            </a:r>
+          </a:p>
+          <a:p>
+            <a:pPr marL="285750" indent="-285750">
+              <a:buFont typeface="Wingdings" panose="05000000000000000000" pitchFamily="2" charset="2"/>
+              <a:buChar char="à"/>
+            </a:pPr>
+            <a:r>
+              <a:rPr kumimoji="1" lang="en-US" altLang="ja-JP" sz="2400" dirty="0" smtClean="0">
+                <a:solidFill>
+                  <a:schemeClr val="accent2"/>
+                </a:solidFill>
+                <a:sym typeface="Wingdings" panose="05000000000000000000" pitchFamily="2" charset="2"/>
+              </a:rPr>
+              <a:t> Number of switches is 4*4 = 16 </a:t>
+            </a:r>
+          </a:p>
+          <a:p>
+            <a:pPr marL="285750" indent="-285750">
+              <a:buFont typeface="Wingdings" panose="05000000000000000000" pitchFamily="2" charset="2"/>
+              <a:buChar char="à"/>
+            </a:pPr>
+            <a:endParaRPr lang="en-US" altLang="ja-JP" sz="2400" dirty="0">
+              <a:solidFill>
+                <a:schemeClr val="accent2"/>
+              </a:solidFill>
+              <a:sym typeface="Wingdings" panose="05000000000000000000" pitchFamily="2" charset="2"/>
+            </a:endParaRPr>
+          </a:p>
+          <a:p>
+            <a:r>
+              <a:rPr kumimoji="1" lang="en-US" altLang="ja-JP" sz="2400" dirty="0" smtClean="0">
+                <a:solidFill>
+                  <a:schemeClr val="bg1"/>
+                </a:solidFill>
+                <a:sym typeface="Wingdings" panose="05000000000000000000" pitchFamily="2" charset="2"/>
+              </a:rPr>
+              <a:t>-T 0</a:t>
+            </a:r>
+          </a:p>
+          <a:p>
+            <a:r>
+              <a:rPr lang="en-US" altLang="ja-JP" sz="2400" dirty="0" smtClean="0">
+                <a:solidFill>
+                  <a:schemeClr val="accent2"/>
+                </a:solidFill>
+                <a:sym typeface="Wingdings" panose="05000000000000000000" pitchFamily="2" charset="2"/>
+              </a:rPr>
+              <a:t> 0 mesh, 1 torus</a:t>
+            </a:r>
+            <a:endParaRPr kumimoji="1" lang="ja-JP" altLang="en-US" sz="2400" dirty="0">
+              <a:solidFill>
+                <a:schemeClr val="accent2"/>
+              </a:solidFill>
+            </a:endParaRPr>
+          </a:p>
+        </p:txBody>
+      </p:sp>
+      <p:cxnSp>
+        <p:nvCxnSpPr>
+          <p:cNvPr id="11" name="直線接點 10"/>
+          <p:cNvCxnSpPr/>
+          <p:nvPr/>
+        </p:nvCxnSpPr>
+        <p:spPr>
+          <a:xfrm>
+            <a:off x="1623060" y="6164580"/>
+            <a:ext cx="3025140" cy="7620"/>
+          </a:xfrm>
+          <a:prstGeom prst="line">
+            <a:avLst/>
+          </a:prstGeom>
+          <a:ln w="38100">
+            <a:solidFill>
+              <a:srgbClr val="C00000"/>
+            </a:solidFill>
+          </a:ln>
+        </p:spPr>
+        <p:style>
+          <a:lnRef idx="1">
+            <a:schemeClr val="accent1"/>
+          </a:lnRef>
+          <a:fillRef idx="0">
+            <a:schemeClr val="accent1"/>
+          </a:fillRef>
+          <a:effectRef idx="0">
+            <a:schemeClr val="accent1"/>
+          </a:effectRef>
+          <a:fontRef idx="minor">
+            <a:schemeClr val="tx1"/>
+          </a:fontRef>
+        </p:style>
+      </p:cxnSp>
+      <p:sp>
+        <p:nvSpPr>
+          <p:cNvPr id="12" name="文字方塊 11"/>
+          <p:cNvSpPr txBox="1"/>
+          <p:nvPr/>
+        </p:nvSpPr>
+        <p:spPr>
+          <a:xfrm>
+            <a:off x="5135880" y="5269528"/>
+            <a:ext cx="4686300" cy="830997"/>
+          </a:xfrm>
+          <a:prstGeom prst="rect">
+            <a:avLst/>
+          </a:prstGeom>
+          <a:noFill/>
+        </p:spPr>
+        <p:txBody>
+          <a:bodyPr wrap="square" rtlCol="0">
+            <a:spAutoFit/>
+          </a:bodyPr>
+          <a:lstStyle/>
+          <a:p>
+            <a:r>
+              <a:rPr kumimoji="1" lang="en-US" altLang="ja-JP" sz="2400" dirty="0" smtClean="0">
+                <a:solidFill>
+                  <a:schemeClr val="bg1"/>
+                </a:solidFill>
+              </a:rPr>
+              <a:t>Routing table for each switch is generated in output/</a:t>
+            </a:r>
+            <a:endParaRPr kumimoji="1" lang="ja-JP" altLang="en-US" sz="2400" dirty="0">
+              <a:solidFill>
+                <a:schemeClr val="accent2"/>
+              </a:solidFill>
+            </a:endParaRPr>
+          </a:p>
+        </p:txBody>
+      </p:sp>
+    </p:spTree>
+    <p:extLst>
+      <p:ext uri="{BB962C8B-B14F-4D97-AF65-F5344CB8AC3E}">
+        <p14:creationId xmlns:p14="http://schemas.microsoft.com/office/powerpoint/2010/main" val="123539632"/>
+      </p:ext>
+    </p:extLst>
+  </p:cSld>
+  <p:clrMapOvr>
+    <a:masterClrMapping/>
+  </p:clrMapOvr>
+</p:sld>
+</file>
+
+<file path=ppt/slides/slide7.xml><?xml version="1.0" encoding="utf-8"?>
+<p:sld xmlns:a="http://schemas.openxmlformats.org/drawingml/2006/main" xmlns:r="http://schemas.openxmlformats.org/officeDocument/2006/relationships" xmlns:p="http://schemas.openxmlformats.org/presentationml/2006/main">
+  <p:cSld>
+    <p:spTree>
+      <p:nvGrpSpPr>
+        <p:cNvPr id="1" name=""/>
+        <p:cNvGrpSpPr/>
+        <p:nvPr/>
+      </p:nvGrpSpPr>
+      <p:grpSpPr>
+        <a:xfrm>
+          <a:off x="0" y="0"/>
+          <a:ext cx="0" cy="0"/>
+          <a:chOff x="0" y="0"/>
+          <a:chExt cx="0" cy="0"/>
+        </a:xfrm>
+      </p:grpSpPr>
+      <p:pic>
+        <p:nvPicPr>
+          <p:cNvPr id="4" name="圖片 3"/>
+          <p:cNvPicPr>
+            <a:picLocks noChangeAspect="1"/>
+          </p:cNvPicPr>
+          <p:nvPr/>
+        </p:nvPicPr>
+        <p:blipFill>
           <a:blip r:embed="rId2">
             <a:extLst>
               <a:ext uri="{28A0092B-C50C-407E-A947-70E740481C1C}">
@@ -8879,7 +11170,7 @@
 </p:sld>
 </file>
 
-<file path=ppt/slides/slide7.xml><?xml version="1.0" encoding="utf-8"?>
+<file path=ppt/slides/slide8.xml><?xml version="1.0" encoding="utf-8"?>
 <p:sld xmlns:a="http://schemas.openxmlformats.org/drawingml/2006/main" xmlns:r="http://schemas.openxmlformats.org/officeDocument/2006/relationships" xmlns:p="http://schemas.openxmlformats.org/presentationml/2006/main">
   <p:cSld>
     <p:spTree>
@@ -9603,4 +11894,265 @@
     </a:ext>
   </a:extLst>
 </a:theme>
+</file>
+
+<file path=ppt/theme/theme2.xml><?xml version="1.0" encoding="utf-8"?>
+<a:theme xmlns:a="http://schemas.openxmlformats.org/drawingml/2006/main" name="ホワイト">
+  <a:themeElements>
+    <a:clrScheme name="Office">
+      <a:dk1>
+        <a:sysClr val="windowText" lastClr="000000"/>
+      </a:dk1>
+      <a:lt1>
+        <a:sysClr val="window" lastClr="FFFFFF"/>
+      </a:lt1>
+      <a:dk2>
+        <a:srgbClr val="44546A"/>
+      </a:dk2>
+      <a:lt2>
+        <a:srgbClr val="E7E6E6"/>
+      </a:lt2>
+      <a:accent1>
+        <a:srgbClr val="4472C4"/>
+      </a:accent1>
+      <a:accent2>
+        <a:srgbClr val="ED7D31"/>
+      </a:accent2>
+      <a:accent3>
+        <a:srgbClr val="A5A5A5"/>
+      </a:accent3>
+      <a:accent4>
+        <a:srgbClr val="FFC000"/>
+      </a:accent4>
+      <a:accent5>
+        <a:srgbClr val="5B9BD5"/>
+      </a:accent5>
+      <a:accent6>
+        <a:srgbClr val="70AD47"/>
+      </a:accent6>
+      <a:hlink>
+        <a:srgbClr val="0563C1"/>
+      </a:hlink>
+      <a:folHlink>
+        <a:srgbClr val="954F72"/>
+      </a:folHlink>
+    </a:clrScheme>
+    <a:fontScheme name="Office">
+      <a:majorFont>
+        <a:latin typeface="Yu Gothic Light" panose="020F0302020204030204"/>
+        <a:ea typeface=""/>
+        <a:cs typeface=""/>
+        <a:font script="Jpan" typeface="Yu Gothic Light"/>
+        <a:font script="Hang" typeface="맑은 고딕"/>
+        <a:font script="Hans" typeface="DengXian Light"/>
+        <a:font script="Hant" typeface="新細明體"/>
+        <a:font script="Arab" typeface="Times New Roman"/>
+        <a:font script="Hebr" typeface="Times New Roman"/>
+        <a:font script="Thai" typeface="Angsana New"/>
+        <a:font script="Ethi" typeface="Nyala"/>
+        <a:font script="Beng" typeface="Vrinda"/>
+        <a:font script="Gujr" typeface="Shruti"/>
+        <a:font script="Khmr" typeface="MoolBoran"/>
+        <a:font script="Knda" typeface="Tunga"/>
+        <a:font script="Guru" typeface="Raavi"/>
+        <a:font script="Cans" typeface="Euphemia"/>
+        <a:font script="Cher" typeface="Plantagenet Cherokee"/>
+        <a:font script="Yiii" typeface="Microsoft Yi Baiti"/>
+        <a:font script="Tibt" typeface="Microsoft Himalaya"/>
+        <a:font script="Thaa" typeface="MV Boli"/>
+        <a:font script="Deva" typeface="Mangal"/>
+        <a:font script="Telu" typeface="Gautami"/>
+        <a:font script="Taml" typeface="Latha"/>
+        <a:font script="Syrc" typeface="Estrangelo Edessa"/>
+        <a:font script="Orya" typeface="Kalinga"/>
+        <a:font script="Mlym" typeface="Kartika"/>
+        <a:font script="Laoo" typeface="DokChampa"/>
+        <a:font script="Sinh" typeface="Iskoola Pota"/>
+        <a:font script="Mong" typeface="Mongolian Baiti"/>
+        <a:font script="Viet" typeface="Times New Roman"/>
+        <a:font script="Uigh" typeface="Microsoft Uighur"/>
+        <a:font script="Geor" typeface="Sylfaen"/>
+      </a:majorFont>
+      <a:minorFont>
+        <a:latin typeface="Yu Gothic" panose="020F0502020204030204"/>
+        <a:ea typeface=""/>
+        <a:cs typeface=""/>
+        <a:font script="Jpan" typeface="Yu Gothic"/>
+        <a:font script="Hang" typeface="맑은 고딕"/>
+        <a:font script="Hans" typeface="DengXian"/>
+        <a:font script="Hant" typeface="新細明體"/>
+        <a:font script="Arab" typeface="Arial"/>
+        <a:font script="Hebr" typeface="Arial"/>
+        <a:font script="Thai" typeface="Cordia New"/>
+        <a:font script="Ethi" typeface="Nyala"/>
+        <a:font script="Beng" typeface="Vrinda"/>
+        <a:font script="Gujr" typeface="Shruti"/>
+        <a:font script="Khmr" typeface="DaunPenh"/>
+        <a:font script="Knda" typeface="Tunga"/>
+        <a:font script="Guru" typeface="Raavi"/>
+        <a:font script="Cans" typeface="Euphemia"/>
+        <a:font script="Cher" typeface="Plantagenet Cherokee"/>
+        <a:font script="Yiii" typeface="Microsoft Yi Baiti"/>
+        <a:font script="Tibt" typeface="Microsoft Himalaya"/>
+        <a:font script="Thaa" typeface="MV Boli"/>
+        <a:font script="Deva" typeface="Mangal"/>
+        <a:font script="Telu" typeface="Gautami"/>
+        <a:font script="Taml" typeface="Latha"/>
+        <a:font script="Syrc" typeface="Estrangelo Edessa"/>
+        <a:font script="Orya" typeface="Kalinga"/>
+        <a:font script="Mlym" typeface="Kartika"/>
+        <a:font script="Laoo" typeface="DokChampa"/>
+        <a:font script="Sinh" typeface="Iskoola Pota"/>
+        <a:font script="Mong" typeface="Mongolian Baiti"/>
+        <a:font script="Viet" typeface="Arial"/>
+        <a:font script="Uigh" typeface="Microsoft Uighur"/>
+        <a:font script="Geor" typeface="Sylfaen"/>
+      </a:minorFont>
+    </a:fontScheme>
+    <a:fmtScheme name="Office">
+      <a:fillStyleLst>
+        <a:solidFill>
+          <a:schemeClr val="phClr"/>
+        </a:solidFill>
+        <a:gradFill rotWithShape="1">
+          <a:gsLst>
+            <a:gs pos="0">
+              <a:schemeClr val="phClr">
+                <a:lumMod val="110000"/>
+                <a:satMod val="105000"/>
+                <a:tint val="67000"/>
+              </a:schemeClr>
+            </a:gs>
+            <a:gs pos="50000">
+              <a:schemeClr val="phClr">
+                <a:lumMod val="105000"/>
+                <a:satMod val="103000"/>
+                <a:tint val="73000"/>
+              </a:schemeClr>
+            </a:gs>
+            <a:gs pos="100000">
+              <a:schemeClr val="phClr">
+                <a:lumMod val="105000"/>
+                <a:satMod val="109000"/>
+                <a:tint val="81000"/>
+              </a:schemeClr>
+            </a:gs>
+          </a:gsLst>
+          <a:lin ang="5400000" scaled="0"/>
+        </a:gradFill>
+        <a:gradFill rotWithShape="1">
+          <a:gsLst>
+            <a:gs pos="0">
+              <a:schemeClr val="phClr">
+                <a:satMod val="103000"/>
+                <a:lumMod val="102000"/>
+                <a:tint val="94000"/>
+              </a:schemeClr>
+            </a:gs>
+            <a:gs pos="50000">
+              <a:schemeClr val="phClr">
+                <a:satMod val="110000"/>
+                <a:lumMod val="100000"/>
+                <a:shade val="100000"/>
+              </a:schemeClr>
+            </a:gs>
+            <a:gs pos="100000">
+              <a:schemeClr val="phClr">
+                <a:lumMod val="99000"/>
+                <a:satMod val="120000"/>
+                <a:shade val="78000"/>
+              </a:schemeClr>
+            </a:gs>
+          </a:gsLst>
+          <a:lin ang="5400000" scaled="0"/>
+        </a:gradFill>
+      </a:fillStyleLst>
+      <a:lnStyleLst>
+        <a:ln w="6350" cap="flat" cmpd="sng" algn="ctr">
+          <a:solidFill>
+            <a:schemeClr val="phClr"/>
+          </a:solidFill>
+          <a:prstDash val="solid"/>
+          <a:miter lim="800000"/>
+        </a:ln>
+        <a:ln w="12700" cap="flat" cmpd="sng" algn="ctr">
+          <a:solidFill>
+            <a:schemeClr val="phClr"/>
+          </a:solidFill>
+          <a:prstDash val="solid"/>
+          <a:miter lim="800000"/>
+        </a:ln>
+        <a:ln w="19050" cap="flat" cmpd="sng" algn="ctr">
+          <a:solidFill>
+            <a:schemeClr val="phClr"/>
+          </a:solidFill>
+          <a:prstDash val="solid"/>
+          <a:miter lim="800000"/>
+        </a:ln>
+      </a:lnStyleLst>
+      <a:effectStyleLst>
+        <a:effectStyle>
+          <a:effectLst/>
+        </a:effectStyle>
+        <a:effectStyle>
+          <a:effectLst/>
+        </a:effectStyle>
+        <a:effectStyle>
+          <a:effectLst>
+            <a:outerShdw blurRad="57150" dist="19050" dir="5400000" algn="ctr" rotWithShape="0">
+              <a:srgbClr val="000000">
+                <a:alpha val="63000"/>
+              </a:srgbClr>
+            </a:outerShdw>
+          </a:effectLst>
+        </a:effectStyle>
+      </a:effectStyleLst>
+      <a:bgFillStyleLst>
+        <a:solidFill>
+          <a:schemeClr val="phClr"/>
+        </a:solidFill>
+        <a:solidFill>
+          <a:schemeClr val="phClr">
+            <a:tint val="95000"/>
+            <a:satMod val="170000"/>
+          </a:schemeClr>
+        </a:solidFill>
+        <a:gradFill rotWithShape="1">
+          <a:gsLst>
+            <a:gs pos="0">
+              <a:schemeClr val="phClr">
+                <a:tint val="93000"/>
+                <a:satMod val="150000"/>
+                <a:shade val="98000"/>
+                <a:lumMod val="102000"/>
+              </a:schemeClr>
+            </a:gs>
+            <a:gs pos="50000">
+              <a:schemeClr val="phClr">
+                <a:tint val="98000"/>
+                <a:satMod val="130000"/>
+                <a:shade val="90000"/>
+                <a:lumMod val="103000"/>
+              </a:schemeClr>
+            </a:gs>
+            <a:gs pos="100000">
+              <a:schemeClr val="phClr">
+                <a:shade val="63000"/>
+                <a:satMod val="120000"/>
+              </a:schemeClr>
+            </a:gs>
+          </a:gsLst>
+          <a:lin ang="5400000" scaled="0"/>
+        </a:gradFill>
+      </a:bgFillStyleLst>
+    </a:fmtScheme>
+  </a:themeElements>
+  <a:objectDefaults/>
+  <a:extraClrSchemeLst/>
+  <a:extLst>
+    <a:ext uri="{05A4C25C-085E-4340-85A3-A5531E510DB2}">
+      <thm15:themeFamily xmlns:thm15="http://schemas.microsoft.com/office/thememl/2012/main" name="Office Theme" id="{62F939B6-93AF-4DB8-9C6B-D6C7DFDC589F}" vid="{4A3C46E8-61CC-4603-A589-7422A47A8E4A}"/>
+    </a:ext>
+  </a:extLst>
+</a:theme>
 </file>
</xml_diff>